<commit_message>
Aggiornamento quesito 5 team
</commit_message>
<xml_diff>
--- a/Quesito 5 Team/Metrica – Linee di codice.pptx
+++ b/Quesito 5 Team/Metrica – Linee di codice.pptx
@@ -26,13 +26,12 @@
     <p:sldId id="274" r:id="rId20"/>
     <p:sldId id="275" r:id="rId21"/>
     <p:sldId id="276" r:id="rId22"/>
-    <p:sldId id="277" r:id="rId23"/>
-    <p:sldId id="278" r:id="rId24"/>
-    <p:sldId id="279" r:id="rId25"/>
-    <p:sldId id="280" r:id="rId26"/>
-    <p:sldId id="281" r:id="rId27"/>
-    <p:sldId id="283" r:id="rId28"/>
-    <p:sldId id="282" r:id="rId29"/>
+    <p:sldId id="280" r:id="rId23"/>
+    <p:sldId id="277" r:id="rId24"/>
+    <p:sldId id="278" r:id="rId25"/>
+    <p:sldId id="279" r:id="rId26"/>
+    <p:sldId id="283" r:id="rId27"/>
+    <p:sldId id="282" r:id="rId28"/>
   </p:sldIdLst>
   <p:sldSz cx="9144000" cy="6858000" type="screen4x3"/>
   <p:notesSz cx="6858000" cy="9144000"/>
@@ -1304,24 +1303,24 @@
     </dgm:pt>
   </dgm:ptLst>
   <dgm:cxnLst>
+    <dgm:cxn modelId="{EAADFA0A-206B-4B2B-A12A-5F4812801835}" srcId="{60F4716F-A203-4D68-8AA7-6E8623D6B001}" destId="{BD814CE5-BFB2-49A8-8EE0-CCD280912F26}" srcOrd="2" destOrd="0" parTransId="{031F79DE-1623-45B4-B0E6-E5F0C0C481B3}" sibTransId="{F2CE1512-DE28-42E5-8539-C2A262BC94D2}"/>
+    <dgm:cxn modelId="{CA15DADB-9039-454D-AFA1-48AB0011D1CC}" type="presOf" srcId="{6971BA4A-1817-41E8-B9C4-2AF913714800}" destId="{EF8783DE-E5A3-4895-9096-F7DCB6B3DEE8}" srcOrd="0" destOrd="0" presId="urn:microsoft.com/office/officeart/2005/8/layout/hierarchy2"/>
+    <dgm:cxn modelId="{3744692D-9134-4C0F-B31D-E8D3BC9962F7}" type="presOf" srcId="{031F79DE-1623-45B4-B0E6-E5F0C0C481B3}" destId="{B066A27A-73CC-43C5-B639-12E28D89EAD9}" srcOrd="0" destOrd="0" presId="urn:microsoft.com/office/officeart/2005/8/layout/hierarchy2"/>
+    <dgm:cxn modelId="{DA06765C-7300-40D5-BE05-456AFF843379}" srcId="{7C061165-1C65-41B8-AC38-C0E8C4B428DE}" destId="{60F4716F-A203-4D68-8AA7-6E8623D6B001}" srcOrd="0" destOrd="0" parTransId="{A4438FFE-B889-476D-ABB9-A42C703AD521}" sibTransId="{E606929B-6B24-445A-BFA1-22707C583D95}"/>
+    <dgm:cxn modelId="{874656CE-C722-4D9B-8A62-04D64826C35F}" type="presOf" srcId="{93F0427A-57FB-4404-88BD-9682F5BAD3B6}" destId="{3FB41E24-A389-47E7-A93A-8AF289324330}" srcOrd="0" destOrd="0" presId="urn:microsoft.com/office/officeart/2005/8/layout/hierarchy2"/>
+    <dgm:cxn modelId="{F5EE14CF-9C2A-4080-AE3D-BB62489BFC25}" type="presOf" srcId="{6929F481-AE8D-40B0-8863-36B44F7C7D88}" destId="{C58C752C-F004-425A-AF28-2ABFE46B18A3}" srcOrd="0" destOrd="0" presId="urn:microsoft.com/office/officeart/2005/8/layout/hierarchy2"/>
+    <dgm:cxn modelId="{61775ED8-CC48-4DBB-8E21-A9246334CBC8}" type="presOf" srcId="{BD814CE5-BFB2-49A8-8EE0-CCD280912F26}" destId="{D5C0286E-0983-448F-9A09-9E5808996C9E}" srcOrd="0" destOrd="0" presId="urn:microsoft.com/office/officeart/2005/8/layout/hierarchy2"/>
     <dgm:cxn modelId="{AD725B0A-9EF6-432D-86F1-24B7B412AAF7}" srcId="{60F4716F-A203-4D68-8AA7-6E8623D6B001}" destId="{6971BA4A-1817-41E8-B9C4-2AF913714800}" srcOrd="0" destOrd="0" parTransId="{93F0427A-57FB-4404-88BD-9682F5BAD3B6}" sibTransId="{1E316E79-2D7E-439F-B303-808ACE16E297}"/>
-    <dgm:cxn modelId="{F5EE14CF-9C2A-4080-AE3D-BB62489BFC25}" type="presOf" srcId="{6929F481-AE8D-40B0-8863-36B44F7C7D88}" destId="{C58C752C-F004-425A-AF28-2ABFE46B18A3}" srcOrd="0" destOrd="0" presId="urn:microsoft.com/office/officeart/2005/8/layout/hierarchy2"/>
-    <dgm:cxn modelId="{3744692D-9134-4C0F-B31D-E8D3BC9962F7}" type="presOf" srcId="{031F79DE-1623-45B4-B0E6-E5F0C0C481B3}" destId="{B066A27A-73CC-43C5-B639-12E28D89EAD9}" srcOrd="0" destOrd="0" presId="urn:microsoft.com/office/officeart/2005/8/layout/hierarchy2"/>
-    <dgm:cxn modelId="{AE37C3E3-2336-4529-86CB-B0B58BF7503F}" type="presOf" srcId="{6929F481-AE8D-40B0-8863-36B44F7C7D88}" destId="{E8CE92EC-65DE-4555-8962-0A880AC55D59}" srcOrd="1" destOrd="0" presId="urn:microsoft.com/office/officeart/2005/8/layout/hierarchy2"/>
-    <dgm:cxn modelId="{FC28073F-98C2-4B1C-AC1C-5105931F6D30}" type="presOf" srcId="{F51987C5-4AB7-4D88-AC82-34825D3D27C0}" destId="{7F7EAA6C-CD5C-4FB9-AF0D-21CC5541AE71}" srcOrd="0" destOrd="0" presId="urn:microsoft.com/office/officeart/2005/8/layout/hierarchy2"/>
-    <dgm:cxn modelId="{61775ED8-CC48-4DBB-8E21-A9246334CBC8}" type="presOf" srcId="{BD814CE5-BFB2-49A8-8EE0-CCD280912F26}" destId="{D5C0286E-0983-448F-9A09-9E5808996C9E}" srcOrd="0" destOrd="0" presId="urn:microsoft.com/office/officeart/2005/8/layout/hierarchy2"/>
+    <dgm:cxn modelId="{20111848-876D-49DB-8A1B-B631746974C9}" srcId="{60F4716F-A203-4D68-8AA7-6E8623D6B001}" destId="{5D81043C-247F-4E2A-8920-3892FAF0A63F}" srcOrd="1" destOrd="0" parTransId="{39696B35-D707-49F6-95CA-5931AF295B05}" sibTransId="{749D074F-A907-4BD3-A124-C262B0DB3659}"/>
+    <dgm:cxn modelId="{A212F120-C81C-455E-BD1C-9C7CEE86FA5E}" type="presOf" srcId="{031F79DE-1623-45B4-B0E6-E5F0C0C481B3}" destId="{86065F5D-98F6-425B-B6FA-248B7C01228B}" srcOrd="1" destOrd="0" presId="urn:microsoft.com/office/officeart/2005/8/layout/hierarchy2"/>
     <dgm:cxn modelId="{3C06A3BA-F427-4AB1-A812-B093D209C48E}" type="presOf" srcId="{39696B35-D707-49F6-95CA-5931AF295B05}" destId="{DC351AA3-9ADA-49DE-AA63-4615ED7C2C05}" srcOrd="0" destOrd="0" presId="urn:microsoft.com/office/officeart/2005/8/layout/hierarchy2"/>
     <dgm:cxn modelId="{7B755533-38FE-4FCF-9259-D1CF03540600}" type="presOf" srcId="{93F0427A-57FB-4404-88BD-9682F5BAD3B6}" destId="{C3E24A02-8B88-4DED-B59D-B307A0410CA4}" srcOrd="1" destOrd="0" presId="urn:microsoft.com/office/officeart/2005/8/layout/hierarchy2"/>
-    <dgm:cxn modelId="{6818A2C2-00C0-41B3-A83F-19283CF8B6C7}" type="presOf" srcId="{39696B35-D707-49F6-95CA-5931AF295B05}" destId="{DB1F3B0A-ED90-4AA0-889F-C0077E0F31EE}" srcOrd="1" destOrd="0" presId="urn:microsoft.com/office/officeart/2005/8/layout/hierarchy2"/>
-    <dgm:cxn modelId="{874656CE-C722-4D9B-8A62-04D64826C35F}" type="presOf" srcId="{93F0427A-57FB-4404-88BD-9682F5BAD3B6}" destId="{3FB41E24-A389-47E7-A93A-8AF289324330}" srcOrd="0" destOrd="0" presId="urn:microsoft.com/office/officeart/2005/8/layout/hierarchy2"/>
-    <dgm:cxn modelId="{EAADFA0A-206B-4B2B-A12A-5F4812801835}" srcId="{60F4716F-A203-4D68-8AA7-6E8623D6B001}" destId="{BD814CE5-BFB2-49A8-8EE0-CCD280912F26}" srcOrd="2" destOrd="0" parTransId="{031F79DE-1623-45B4-B0E6-E5F0C0C481B3}" sibTransId="{F2CE1512-DE28-42E5-8539-C2A262BC94D2}"/>
-    <dgm:cxn modelId="{CA15DADB-9039-454D-AFA1-48AB0011D1CC}" type="presOf" srcId="{6971BA4A-1817-41E8-B9C4-2AF913714800}" destId="{EF8783DE-E5A3-4895-9096-F7DCB6B3DEE8}" srcOrd="0" destOrd="0" presId="urn:microsoft.com/office/officeart/2005/8/layout/hierarchy2"/>
-    <dgm:cxn modelId="{20111848-876D-49DB-8A1B-B631746974C9}" srcId="{60F4716F-A203-4D68-8AA7-6E8623D6B001}" destId="{5D81043C-247F-4E2A-8920-3892FAF0A63F}" srcOrd="1" destOrd="0" parTransId="{39696B35-D707-49F6-95CA-5931AF295B05}" sibTransId="{749D074F-A907-4BD3-A124-C262B0DB3659}"/>
     <dgm:cxn modelId="{83294595-BDBB-416C-A063-59171C06CEE1}" srcId="{60F4716F-A203-4D68-8AA7-6E8623D6B001}" destId="{F51987C5-4AB7-4D88-AC82-34825D3D27C0}" srcOrd="3" destOrd="0" parTransId="{6929F481-AE8D-40B0-8863-36B44F7C7D88}" sibTransId="{6516CB76-83D3-413B-BFD9-7106B22FEAA6}"/>
     <dgm:cxn modelId="{D7B07AC0-5F21-424C-A083-0BD63154D829}" type="presOf" srcId="{7C061165-1C65-41B8-AC38-C0E8C4B428DE}" destId="{157A27D3-DE90-4E2C-8A74-36E703DDBCDD}" srcOrd="0" destOrd="0" presId="urn:microsoft.com/office/officeart/2005/8/layout/hierarchy2"/>
+    <dgm:cxn modelId="{FC28073F-98C2-4B1C-AC1C-5105931F6D30}" type="presOf" srcId="{F51987C5-4AB7-4D88-AC82-34825D3D27C0}" destId="{7F7EAA6C-CD5C-4FB9-AF0D-21CC5541AE71}" srcOrd="0" destOrd="0" presId="urn:microsoft.com/office/officeart/2005/8/layout/hierarchy2"/>
+    <dgm:cxn modelId="{AE37C3E3-2336-4529-86CB-B0B58BF7503F}" type="presOf" srcId="{6929F481-AE8D-40B0-8863-36B44F7C7D88}" destId="{E8CE92EC-65DE-4555-8962-0A880AC55D59}" srcOrd="1" destOrd="0" presId="urn:microsoft.com/office/officeart/2005/8/layout/hierarchy2"/>
+    <dgm:cxn modelId="{6818A2C2-00C0-41B3-A83F-19283CF8B6C7}" type="presOf" srcId="{39696B35-D707-49F6-95CA-5931AF295B05}" destId="{DB1F3B0A-ED90-4AA0-889F-C0077E0F31EE}" srcOrd="1" destOrd="0" presId="urn:microsoft.com/office/officeart/2005/8/layout/hierarchy2"/>
     <dgm:cxn modelId="{3F7A0A55-D397-406E-80C3-3B560AD1EA35}" type="presOf" srcId="{60F4716F-A203-4D68-8AA7-6E8623D6B001}" destId="{485BDF49-0F5A-4FE1-A6A5-80E679D7252D}" srcOrd="0" destOrd="0" presId="urn:microsoft.com/office/officeart/2005/8/layout/hierarchy2"/>
-    <dgm:cxn modelId="{A212F120-C81C-455E-BD1C-9C7CEE86FA5E}" type="presOf" srcId="{031F79DE-1623-45B4-B0E6-E5F0C0C481B3}" destId="{86065F5D-98F6-425B-B6FA-248B7C01228B}" srcOrd="1" destOrd="0" presId="urn:microsoft.com/office/officeart/2005/8/layout/hierarchy2"/>
-    <dgm:cxn modelId="{DA06765C-7300-40D5-BE05-456AFF843379}" srcId="{7C061165-1C65-41B8-AC38-C0E8C4B428DE}" destId="{60F4716F-A203-4D68-8AA7-6E8623D6B001}" srcOrd="0" destOrd="0" parTransId="{A4438FFE-B889-476D-ABB9-A42C703AD521}" sibTransId="{E606929B-6B24-445A-BFA1-22707C583D95}"/>
     <dgm:cxn modelId="{92FE67FE-DB96-40D9-8DF5-D6C8564B83CF}" type="presOf" srcId="{5D81043C-247F-4E2A-8920-3892FAF0A63F}" destId="{EC31FF1F-9BD3-4980-8427-708CB7AF646A}" srcOrd="0" destOrd="0" presId="urn:microsoft.com/office/officeart/2005/8/layout/hierarchy2"/>
     <dgm:cxn modelId="{0FBF75A2-D678-40A3-9C5B-79F7BEFC10CA}" type="presParOf" srcId="{157A27D3-DE90-4E2C-8A74-36E703DDBCDD}" destId="{E99D45AF-6110-4DC1-BD0F-E74806027936}" srcOrd="0" destOrd="0" presId="urn:microsoft.com/office/officeart/2005/8/layout/hierarchy2"/>
     <dgm:cxn modelId="{0FB64AAB-E7C6-499A-8359-C9C68DCAD543}" type="presParOf" srcId="{E99D45AF-6110-4DC1-BD0F-E74806027936}" destId="{485BDF49-0F5A-4FE1-A6A5-80E679D7252D}" srcOrd="0" destOrd="0" presId="urn:microsoft.com/office/officeart/2005/8/layout/hierarchy2"/>
@@ -1349,7 +1348,735 @@
   </dgm:cxnLst>
   <dgm:bg/>
   <dgm:whole/>
+  <dgm:extLst>
+    <a:ext uri="http://schemas.microsoft.com/office/drawing/2008/diagram">
+      <dsp:dataModelExt xmlns:dsp="http://schemas.microsoft.com/office/drawing/2008/diagram" relId="rId6" minVer="http://schemas.openxmlformats.org/drawingml/2006/diagram"/>
+    </a:ext>
+  </dgm:extLst>
 </dgm:dataModel>
+</file>
+
+<file path=ppt/diagrams/drawing1.xml><?xml version="1.0" encoding="utf-8"?>
+<dsp:drawing xmlns:dgm="http://schemas.openxmlformats.org/drawingml/2006/diagram" xmlns:dsp="http://schemas.microsoft.com/office/drawing/2008/diagram" xmlns:a="http://schemas.openxmlformats.org/drawingml/2006/main">
+  <dsp:spTree>
+    <dsp:nvGrpSpPr>
+      <dsp:cNvPr id="0" name=""/>
+      <dsp:cNvGrpSpPr/>
+    </dsp:nvGrpSpPr>
+    <dsp:grpSpPr/>
+    <dsp:sp modelId="{485BDF49-0F5A-4FE1-A6A5-80E679D7252D}">
+      <dsp:nvSpPr>
+        <dsp:cNvPr id="0" name=""/>
+        <dsp:cNvSpPr/>
+      </dsp:nvSpPr>
+      <dsp:spPr>
+        <a:xfrm>
+          <a:off x="111" y="1561241"/>
+          <a:ext cx="1756091" cy="878045"/>
+        </a:xfrm>
+        <a:prstGeom prst="roundRect">
+          <a:avLst>
+            <a:gd name="adj" fmla="val 10000"/>
+          </a:avLst>
+        </a:prstGeom>
+        <a:solidFill>
+          <a:schemeClr val="accent1">
+            <a:hueOff val="0"/>
+            <a:satOff val="0"/>
+            <a:lumOff val="0"/>
+            <a:alphaOff val="0"/>
+          </a:schemeClr>
+        </a:solidFill>
+        <a:ln w="25400" cap="flat" cmpd="sng" algn="ctr">
+          <a:solidFill>
+            <a:schemeClr val="lt1">
+              <a:hueOff val="0"/>
+              <a:satOff val="0"/>
+              <a:lumOff val="0"/>
+              <a:alphaOff val="0"/>
+            </a:schemeClr>
+          </a:solidFill>
+          <a:prstDash val="solid"/>
+        </a:ln>
+        <a:effectLst/>
+      </dsp:spPr>
+      <dsp:style>
+        <a:lnRef idx="2">
+          <a:scrgbClr r="0" g="0" b="0"/>
+        </a:lnRef>
+        <a:fillRef idx="1">
+          <a:scrgbClr r="0" g="0" b="0"/>
+        </a:fillRef>
+        <a:effectRef idx="0">
+          <a:scrgbClr r="0" g="0" b="0"/>
+        </a:effectRef>
+        <a:fontRef idx="minor">
+          <a:schemeClr val="lt1"/>
+        </a:fontRef>
+      </dsp:style>
+      <dsp:txBody>
+        <a:bodyPr spcFirstLastPara="0" vert="horz" wrap="square" lIns="17780" tIns="17780" rIns="17780" bIns="17780" numCol="1" spcCol="1270" anchor="ctr" anchorCtr="0">
+          <a:noAutofit/>
+        </a:bodyPr>
+        <a:lstStyle/>
+        <a:p>
+          <a:pPr lvl="0" algn="ctr" defTabSz="1244600">
+            <a:lnSpc>
+              <a:spcPct val="90000"/>
+            </a:lnSpc>
+            <a:spcBef>
+              <a:spcPct val="0"/>
+            </a:spcBef>
+            <a:spcAft>
+              <a:spcPct val="35000"/>
+            </a:spcAft>
+          </a:pPr>
+          <a:r>
+            <a:rPr lang="it-IT" sz="2800" kern="1200" dirty="0" smtClean="0"/>
+            <a:t>ISO/IEC 9126</a:t>
+          </a:r>
+          <a:endParaRPr lang="it-IT" sz="2800" kern="1200" dirty="0"/>
+        </a:p>
+      </dsp:txBody>
+      <dsp:txXfrm>
+        <a:off x="25828" y="1586958"/>
+        <a:ext cx="1704657" cy="826611"/>
+      </dsp:txXfrm>
+    </dsp:sp>
+    <dsp:sp modelId="{3FB41E24-A389-47E7-A93A-8AF289324330}">
+      <dsp:nvSpPr>
+        <dsp:cNvPr id="0" name=""/>
+        <dsp:cNvSpPr/>
+      </dsp:nvSpPr>
+      <dsp:spPr>
+        <a:xfrm rot="17622133">
+          <a:off x="1261281" y="1222717"/>
+          <a:ext cx="1655207" cy="39506"/>
+        </a:xfrm>
+        <a:custGeom>
+          <a:avLst/>
+          <a:gdLst/>
+          <a:ahLst/>
+          <a:cxnLst/>
+          <a:rect l="0" t="0" r="0" b="0"/>
+          <a:pathLst>
+            <a:path>
+              <a:moveTo>
+                <a:pt x="0" y="19753"/>
+              </a:moveTo>
+              <a:lnTo>
+                <a:pt x="1655207" y="19753"/>
+              </a:lnTo>
+            </a:path>
+          </a:pathLst>
+        </a:custGeom>
+        <a:noFill/>
+        <a:ln w="25400" cap="flat" cmpd="sng" algn="ctr">
+          <a:solidFill>
+            <a:schemeClr val="accent1">
+              <a:shade val="60000"/>
+              <a:hueOff val="0"/>
+              <a:satOff val="0"/>
+              <a:lumOff val="0"/>
+              <a:alphaOff val="0"/>
+            </a:schemeClr>
+          </a:solidFill>
+          <a:prstDash val="solid"/>
+        </a:ln>
+        <a:effectLst/>
+      </dsp:spPr>
+      <dsp:style>
+        <a:lnRef idx="2">
+          <a:scrgbClr r="0" g="0" b="0"/>
+        </a:lnRef>
+        <a:fillRef idx="0">
+          <a:scrgbClr r="0" g="0" b="0"/>
+        </a:fillRef>
+        <a:effectRef idx="0">
+          <a:scrgbClr r="0" g="0" b="0"/>
+        </a:effectRef>
+        <a:fontRef idx="minor"/>
+      </dsp:style>
+      <dsp:txBody>
+        <a:bodyPr spcFirstLastPara="0" vert="horz" wrap="square" lIns="12700" tIns="0" rIns="12700" bIns="0" numCol="1" spcCol="1270" anchor="ctr" anchorCtr="0">
+          <a:noAutofit/>
+        </a:bodyPr>
+        <a:lstStyle/>
+        <a:p>
+          <a:pPr lvl="0" algn="ctr" defTabSz="222250">
+            <a:lnSpc>
+              <a:spcPct val="90000"/>
+            </a:lnSpc>
+            <a:spcBef>
+              <a:spcPct val="0"/>
+            </a:spcBef>
+            <a:spcAft>
+              <a:spcPct val="35000"/>
+            </a:spcAft>
+          </a:pPr>
+          <a:endParaRPr lang="it-IT" sz="500" kern="1200"/>
+        </a:p>
+      </dsp:txBody>
+      <dsp:txXfrm>
+        <a:off x="2047505" y="1201090"/>
+        <a:ext cx="82760" cy="82760"/>
+      </dsp:txXfrm>
+    </dsp:sp>
+    <dsp:sp modelId="{EF8783DE-E5A3-4895-9096-F7DCB6B3DEE8}">
+      <dsp:nvSpPr>
+        <dsp:cNvPr id="0" name=""/>
+        <dsp:cNvSpPr/>
+      </dsp:nvSpPr>
+      <dsp:spPr>
+        <a:xfrm>
+          <a:off x="2421568" y="45655"/>
+          <a:ext cx="1756091" cy="878045"/>
+        </a:xfrm>
+        <a:prstGeom prst="roundRect">
+          <a:avLst>
+            <a:gd name="adj" fmla="val 10000"/>
+          </a:avLst>
+        </a:prstGeom>
+        <a:solidFill>
+          <a:schemeClr val="accent1">
+            <a:hueOff val="0"/>
+            <a:satOff val="0"/>
+            <a:lumOff val="0"/>
+            <a:alphaOff val="0"/>
+          </a:schemeClr>
+        </a:solidFill>
+        <a:ln w="25400" cap="flat" cmpd="sng" algn="ctr">
+          <a:solidFill>
+            <a:schemeClr val="lt1">
+              <a:hueOff val="0"/>
+              <a:satOff val="0"/>
+              <a:lumOff val="0"/>
+              <a:alphaOff val="0"/>
+            </a:schemeClr>
+          </a:solidFill>
+          <a:prstDash val="solid"/>
+        </a:ln>
+        <a:effectLst/>
+      </dsp:spPr>
+      <dsp:style>
+        <a:lnRef idx="2">
+          <a:scrgbClr r="0" g="0" b="0"/>
+        </a:lnRef>
+        <a:fillRef idx="1">
+          <a:scrgbClr r="0" g="0" b="0"/>
+        </a:fillRef>
+        <a:effectRef idx="0">
+          <a:scrgbClr r="0" g="0" b="0"/>
+        </a:effectRef>
+        <a:fontRef idx="minor">
+          <a:schemeClr val="lt1"/>
+        </a:fontRef>
+      </dsp:style>
+      <dsp:txBody>
+        <a:bodyPr spcFirstLastPara="0" vert="horz" wrap="square" lIns="17780" tIns="17780" rIns="17780" bIns="17780" numCol="1" spcCol="1270" anchor="ctr" anchorCtr="0">
+          <a:noAutofit/>
+        </a:bodyPr>
+        <a:lstStyle/>
+        <a:p>
+          <a:pPr lvl="0" algn="ctr" defTabSz="1244600">
+            <a:lnSpc>
+              <a:spcPct val="90000"/>
+            </a:lnSpc>
+            <a:spcBef>
+              <a:spcPct val="0"/>
+            </a:spcBef>
+            <a:spcAft>
+              <a:spcPct val="35000"/>
+            </a:spcAft>
+          </a:pPr>
+          <a:r>
+            <a:rPr lang="it-IT" sz="2800" kern="1200" dirty="0" smtClean="0"/>
+            <a:t>Modello</a:t>
+          </a:r>
+          <a:endParaRPr lang="it-IT" sz="2800" kern="1200" dirty="0"/>
+        </a:p>
+      </dsp:txBody>
+      <dsp:txXfrm>
+        <a:off x="2447285" y="71372"/>
+        <a:ext cx="1704657" cy="826611"/>
+      </dsp:txXfrm>
+    </dsp:sp>
+    <dsp:sp modelId="{DC351AA3-9ADA-49DE-AA63-4615ED7C2C05}">
+      <dsp:nvSpPr>
+        <dsp:cNvPr id="0" name=""/>
+        <dsp:cNvSpPr/>
+      </dsp:nvSpPr>
+      <dsp:spPr>
+        <a:xfrm rot="1920078">
+          <a:off x="1693256" y="2200021"/>
+          <a:ext cx="828441" cy="39506"/>
+        </a:xfrm>
+        <a:custGeom>
+          <a:avLst/>
+          <a:gdLst/>
+          <a:ahLst/>
+          <a:cxnLst/>
+          <a:rect l="0" t="0" r="0" b="0"/>
+          <a:pathLst>
+            <a:path>
+              <a:moveTo>
+                <a:pt x="0" y="19753"/>
+              </a:moveTo>
+              <a:lnTo>
+                <a:pt x="828441" y="19753"/>
+              </a:lnTo>
+            </a:path>
+          </a:pathLst>
+        </a:custGeom>
+        <a:noFill/>
+        <a:ln w="25400" cap="flat" cmpd="sng" algn="ctr">
+          <a:solidFill>
+            <a:schemeClr val="accent1">
+              <a:shade val="60000"/>
+              <a:hueOff val="0"/>
+              <a:satOff val="0"/>
+              <a:lumOff val="0"/>
+              <a:alphaOff val="0"/>
+            </a:schemeClr>
+          </a:solidFill>
+          <a:prstDash val="solid"/>
+        </a:ln>
+        <a:effectLst/>
+      </dsp:spPr>
+      <dsp:style>
+        <a:lnRef idx="2">
+          <a:scrgbClr r="0" g="0" b="0"/>
+        </a:lnRef>
+        <a:fillRef idx="0">
+          <a:scrgbClr r="0" g="0" b="0"/>
+        </a:fillRef>
+        <a:effectRef idx="0">
+          <a:scrgbClr r="0" g="0" b="0"/>
+        </a:effectRef>
+        <a:fontRef idx="minor"/>
+      </dsp:style>
+      <dsp:txBody>
+        <a:bodyPr spcFirstLastPara="0" vert="horz" wrap="square" lIns="12700" tIns="0" rIns="12700" bIns="0" numCol="1" spcCol="1270" anchor="ctr" anchorCtr="0">
+          <a:noAutofit/>
+        </a:bodyPr>
+        <a:lstStyle/>
+        <a:p>
+          <a:pPr lvl="0" algn="ctr" defTabSz="222250">
+            <a:lnSpc>
+              <a:spcPct val="90000"/>
+            </a:lnSpc>
+            <a:spcBef>
+              <a:spcPct val="0"/>
+            </a:spcBef>
+            <a:spcAft>
+              <a:spcPct val="35000"/>
+            </a:spcAft>
+          </a:pPr>
+          <a:endParaRPr lang="it-IT" sz="500" kern="1200"/>
+        </a:p>
+      </dsp:txBody>
+      <dsp:txXfrm>
+        <a:off x="2086765" y="2199064"/>
+        <a:ext cx="41422" cy="41422"/>
+      </dsp:txXfrm>
+    </dsp:sp>
+    <dsp:sp modelId="{EC31FF1F-9BD3-4980-8427-708CB7AF646A}">
+      <dsp:nvSpPr>
+        <dsp:cNvPr id="0" name=""/>
+        <dsp:cNvSpPr/>
+      </dsp:nvSpPr>
+      <dsp:spPr>
+        <a:xfrm>
+          <a:off x="2458750" y="2000264"/>
+          <a:ext cx="1756091" cy="878045"/>
+        </a:xfrm>
+        <a:prstGeom prst="roundRect">
+          <a:avLst>
+            <a:gd name="adj" fmla="val 10000"/>
+          </a:avLst>
+        </a:prstGeom>
+        <a:solidFill>
+          <a:schemeClr val="accent1">
+            <a:hueOff val="0"/>
+            <a:satOff val="0"/>
+            <a:lumOff val="0"/>
+            <a:alphaOff val="0"/>
+          </a:schemeClr>
+        </a:solidFill>
+        <a:ln w="25400" cap="flat" cmpd="sng" algn="ctr">
+          <a:solidFill>
+            <a:schemeClr val="lt1">
+              <a:hueOff val="0"/>
+              <a:satOff val="0"/>
+              <a:lumOff val="0"/>
+              <a:alphaOff val="0"/>
+            </a:schemeClr>
+          </a:solidFill>
+          <a:prstDash val="solid"/>
+        </a:ln>
+        <a:effectLst/>
+      </dsp:spPr>
+      <dsp:style>
+        <a:lnRef idx="2">
+          <a:scrgbClr r="0" g="0" b="0"/>
+        </a:lnRef>
+        <a:fillRef idx="1">
+          <a:scrgbClr r="0" g="0" b="0"/>
+        </a:fillRef>
+        <a:effectRef idx="0">
+          <a:scrgbClr r="0" g="0" b="0"/>
+        </a:effectRef>
+        <a:fontRef idx="minor">
+          <a:schemeClr val="lt1"/>
+        </a:fontRef>
+      </dsp:style>
+      <dsp:txBody>
+        <a:bodyPr spcFirstLastPara="0" vert="horz" wrap="square" lIns="17780" tIns="17780" rIns="17780" bIns="17780" numCol="1" spcCol="1270" anchor="ctr" anchorCtr="0">
+          <a:noAutofit/>
+        </a:bodyPr>
+        <a:lstStyle/>
+        <a:p>
+          <a:pPr lvl="0" algn="ctr" defTabSz="1244600">
+            <a:lnSpc>
+              <a:spcPct val="90000"/>
+            </a:lnSpc>
+            <a:spcBef>
+              <a:spcPct val="0"/>
+            </a:spcBef>
+            <a:spcAft>
+              <a:spcPct val="35000"/>
+            </a:spcAft>
+          </a:pPr>
+          <a:r>
+            <a:rPr lang="it-IT" sz="2800" kern="1200" dirty="0" smtClean="0"/>
+            <a:t>Qualità interne</a:t>
+          </a:r>
+          <a:endParaRPr lang="it-IT" sz="2800" kern="1200" dirty="0"/>
+        </a:p>
+      </dsp:txBody>
+      <dsp:txXfrm>
+        <a:off x="2484467" y="2025981"/>
+        <a:ext cx="1704657" cy="826611"/>
+      </dsp:txXfrm>
+    </dsp:sp>
+    <dsp:sp modelId="{B066A27A-73CC-43C5-B639-12E28D89EAD9}">
+      <dsp:nvSpPr>
+        <dsp:cNvPr id="0" name=""/>
+        <dsp:cNvSpPr/>
+      </dsp:nvSpPr>
+      <dsp:spPr>
+        <a:xfrm rot="19578233">
+          <a:off x="1685268" y="1746274"/>
+          <a:ext cx="844417" cy="39506"/>
+        </a:xfrm>
+        <a:custGeom>
+          <a:avLst/>
+          <a:gdLst/>
+          <a:ahLst/>
+          <a:cxnLst/>
+          <a:rect l="0" t="0" r="0" b="0"/>
+          <a:pathLst>
+            <a:path>
+              <a:moveTo>
+                <a:pt x="0" y="19753"/>
+              </a:moveTo>
+              <a:lnTo>
+                <a:pt x="844417" y="19753"/>
+              </a:lnTo>
+            </a:path>
+          </a:pathLst>
+        </a:custGeom>
+        <a:noFill/>
+        <a:ln w="25400" cap="flat" cmpd="sng" algn="ctr">
+          <a:solidFill>
+            <a:schemeClr val="accent1">
+              <a:shade val="60000"/>
+              <a:hueOff val="0"/>
+              <a:satOff val="0"/>
+              <a:lumOff val="0"/>
+              <a:alphaOff val="0"/>
+            </a:schemeClr>
+          </a:solidFill>
+          <a:prstDash val="solid"/>
+        </a:ln>
+        <a:effectLst/>
+      </dsp:spPr>
+      <dsp:style>
+        <a:lnRef idx="2">
+          <a:scrgbClr r="0" g="0" b="0"/>
+        </a:lnRef>
+        <a:fillRef idx="0">
+          <a:scrgbClr r="0" g="0" b="0"/>
+        </a:fillRef>
+        <a:effectRef idx="0">
+          <a:scrgbClr r="0" g="0" b="0"/>
+        </a:effectRef>
+        <a:fontRef idx="minor"/>
+      </dsp:style>
+      <dsp:txBody>
+        <a:bodyPr spcFirstLastPara="0" vert="horz" wrap="square" lIns="12700" tIns="0" rIns="12700" bIns="0" numCol="1" spcCol="1270" anchor="ctr" anchorCtr="0">
+          <a:noAutofit/>
+        </a:bodyPr>
+        <a:lstStyle/>
+        <a:p>
+          <a:pPr lvl="0" algn="ctr" defTabSz="222250">
+            <a:lnSpc>
+              <a:spcPct val="90000"/>
+            </a:lnSpc>
+            <a:spcBef>
+              <a:spcPct val="0"/>
+            </a:spcBef>
+            <a:spcAft>
+              <a:spcPct val="35000"/>
+            </a:spcAft>
+          </a:pPr>
+          <a:endParaRPr lang="it-IT" sz="500" kern="1200"/>
+        </a:p>
+      </dsp:txBody>
+      <dsp:txXfrm>
+        <a:off x="2086366" y="1744917"/>
+        <a:ext cx="42220" cy="42220"/>
+      </dsp:txXfrm>
+    </dsp:sp>
+    <dsp:sp modelId="{D5C0286E-0983-448F-9A09-9E5808996C9E}">
+      <dsp:nvSpPr>
+        <dsp:cNvPr id="0" name=""/>
+        <dsp:cNvSpPr/>
+      </dsp:nvSpPr>
+      <dsp:spPr>
+        <a:xfrm>
+          <a:off x="2458750" y="1092768"/>
+          <a:ext cx="1756091" cy="878045"/>
+        </a:xfrm>
+        <a:prstGeom prst="roundRect">
+          <a:avLst>
+            <a:gd name="adj" fmla="val 10000"/>
+          </a:avLst>
+        </a:prstGeom>
+        <a:solidFill>
+          <a:schemeClr val="accent1">
+            <a:hueOff val="0"/>
+            <a:satOff val="0"/>
+            <a:lumOff val="0"/>
+            <a:alphaOff val="0"/>
+          </a:schemeClr>
+        </a:solidFill>
+        <a:ln w="25400" cap="flat" cmpd="sng" algn="ctr">
+          <a:solidFill>
+            <a:schemeClr val="lt1">
+              <a:hueOff val="0"/>
+              <a:satOff val="0"/>
+              <a:lumOff val="0"/>
+              <a:alphaOff val="0"/>
+            </a:schemeClr>
+          </a:solidFill>
+          <a:prstDash val="solid"/>
+        </a:ln>
+        <a:effectLst/>
+      </dsp:spPr>
+      <dsp:style>
+        <a:lnRef idx="2">
+          <a:scrgbClr r="0" g="0" b="0"/>
+        </a:lnRef>
+        <a:fillRef idx="1">
+          <a:scrgbClr r="0" g="0" b="0"/>
+        </a:fillRef>
+        <a:effectRef idx="0">
+          <a:scrgbClr r="0" g="0" b="0"/>
+        </a:effectRef>
+        <a:fontRef idx="minor">
+          <a:schemeClr val="lt1"/>
+        </a:fontRef>
+      </dsp:style>
+      <dsp:txBody>
+        <a:bodyPr spcFirstLastPara="0" vert="horz" wrap="square" lIns="17780" tIns="17780" rIns="17780" bIns="17780" numCol="1" spcCol="1270" anchor="ctr" anchorCtr="0">
+          <a:noAutofit/>
+        </a:bodyPr>
+        <a:lstStyle/>
+        <a:p>
+          <a:pPr lvl="0" algn="ctr" defTabSz="1244600">
+            <a:lnSpc>
+              <a:spcPct val="90000"/>
+            </a:lnSpc>
+            <a:spcBef>
+              <a:spcPct val="0"/>
+            </a:spcBef>
+            <a:spcAft>
+              <a:spcPct val="35000"/>
+            </a:spcAft>
+          </a:pPr>
+          <a:r>
+            <a:rPr lang="it-IT" sz="2800" kern="1200" dirty="0" smtClean="0"/>
+            <a:t>Qualità Esterne</a:t>
+          </a:r>
+          <a:endParaRPr lang="it-IT" sz="2800" kern="1200" dirty="0"/>
+        </a:p>
+      </dsp:txBody>
+      <dsp:txXfrm>
+        <a:off x="2484467" y="1118485"/>
+        <a:ext cx="1704657" cy="826611"/>
+      </dsp:txXfrm>
+    </dsp:sp>
+    <dsp:sp modelId="{C58C752C-F004-425A-AF28-2ABFE46B18A3}">
+      <dsp:nvSpPr>
+        <dsp:cNvPr id="0" name=""/>
+        <dsp:cNvSpPr/>
+      </dsp:nvSpPr>
+      <dsp:spPr>
+        <a:xfrm rot="3952873">
+          <a:off x="1274743" y="2723578"/>
+          <a:ext cx="1628284" cy="39506"/>
+        </a:xfrm>
+        <a:custGeom>
+          <a:avLst/>
+          <a:gdLst/>
+          <a:ahLst/>
+          <a:cxnLst/>
+          <a:rect l="0" t="0" r="0" b="0"/>
+          <a:pathLst>
+            <a:path>
+              <a:moveTo>
+                <a:pt x="0" y="19753"/>
+              </a:moveTo>
+              <a:lnTo>
+                <a:pt x="1628284" y="19753"/>
+              </a:lnTo>
+            </a:path>
+          </a:pathLst>
+        </a:custGeom>
+        <a:noFill/>
+        <a:ln w="25400" cap="flat" cmpd="sng" algn="ctr">
+          <a:solidFill>
+            <a:schemeClr val="accent1">
+              <a:shade val="60000"/>
+              <a:hueOff val="0"/>
+              <a:satOff val="0"/>
+              <a:lumOff val="0"/>
+              <a:alphaOff val="0"/>
+            </a:schemeClr>
+          </a:solidFill>
+          <a:prstDash val="solid"/>
+        </a:ln>
+        <a:effectLst/>
+      </dsp:spPr>
+      <dsp:style>
+        <a:lnRef idx="2">
+          <a:scrgbClr r="0" g="0" b="0"/>
+        </a:lnRef>
+        <a:fillRef idx="0">
+          <a:scrgbClr r="0" g="0" b="0"/>
+        </a:fillRef>
+        <a:effectRef idx="0">
+          <a:scrgbClr r="0" g="0" b="0"/>
+        </a:effectRef>
+        <a:fontRef idx="minor"/>
+      </dsp:style>
+      <dsp:txBody>
+        <a:bodyPr spcFirstLastPara="0" vert="horz" wrap="square" lIns="12700" tIns="0" rIns="12700" bIns="0" numCol="1" spcCol="1270" anchor="ctr" anchorCtr="0">
+          <a:noAutofit/>
+        </a:bodyPr>
+        <a:lstStyle/>
+        <a:p>
+          <a:pPr lvl="0" algn="ctr" defTabSz="222250">
+            <a:lnSpc>
+              <a:spcPct val="90000"/>
+            </a:lnSpc>
+            <a:spcBef>
+              <a:spcPct val="0"/>
+            </a:spcBef>
+            <a:spcAft>
+              <a:spcPct val="35000"/>
+            </a:spcAft>
+          </a:pPr>
+          <a:endParaRPr lang="it-IT" sz="500" kern="1200"/>
+        </a:p>
+      </dsp:txBody>
+      <dsp:txXfrm>
+        <a:off x="2048178" y="2702624"/>
+        <a:ext cx="81414" cy="81414"/>
+      </dsp:txXfrm>
+    </dsp:sp>
+    <dsp:sp modelId="{7F7EAA6C-CD5C-4FB9-AF0D-21CC5541AE71}">
+      <dsp:nvSpPr>
+        <dsp:cNvPr id="0" name=""/>
+        <dsp:cNvSpPr/>
+      </dsp:nvSpPr>
+      <dsp:spPr>
+        <a:xfrm>
+          <a:off x="2421568" y="3047377"/>
+          <a:ext cx="1756091" cy="878045"/>
+        </a:xfrm>
+        <a:prstGeom prst="roundRect">
+          <a:avLst>
+            <a:gd name="adj" fmla="val 10000"/>
+          </a:avLst>
+        </a:prstGeom>
+        <a:solidFill>
+          <a:schemeClr val="accent1">
+            <a:hueOff val="0"/>
+            <a:satOff val="0"/>
+            <a:lumOff val="0"/>
+            <a:alphaOff val="0"/>
+          </a:schemeClr>
+        </a:solidFill>
+        <a:ln w="25400" cap="flat" cmpd="sng" algn="ctr">
+          <a:solidFill>
+            <a:schemeClr val="lt1">
+              <a:hueOff val="0"/>
+              <a:satOff val="0"/>
+              <a:lumOff val="0"/>
+              <a:alphaOff val="0"/>
+            </a:schemeClr>
+          </a:solidFill>
+          <a:prstDash val="solid"/>
+        </a:ln>
+        <a:effectLst/>
+      </dsp:spPr>
+      <dsp:style>
+        <a:lnRef idx="2">
+          <a:scrgbClr r="0" g="0" b="0"/>
+        </a:lnRef>
+        <a:fillRef idx="1">
+          <a:scrgbClr r="0" g="0" b="0"/>
+        </a:fillRef>
+        <a:effectRef idx="0">
+          <a:scrgbClr r="0" g="0" b="0"/>
+        </a:effectRef>
+        <a:fontRef idx="minor">
+          <a:schemeClr val="lt1"/>
+        </a:fontRef>
+      </dsp:style>
+      <dsp:txBody>
+        <a:bodyPr spcFirstLastPara="0" vert="horz" wrap="square" lIns="17780" tIns="17780" rIns="17780" bIns="17780" numCol="1" spcCol="1270" anchor="ctr" anchorCtr="0">
+          <a:noAutofit/>
+        </a:bodyPr>
+        <a:lstStyle/>
+        <a:p>
+          <a:pPr lvl="0" algn="ctr" defTabSz="1244600">
+            <a:lnSpc>
+              <a:spcPct val="90000"/>
+            </a:lnSpc>
+            <a:spcBef>
+              <a:spcPct val="0"/>
+            </a:spcBef>
+            <a:spcAft>
+              <a:spcPct val="35000"/>
+            </a:spcAft>
+          </a:pPr>
+          <a:r>
+            <a:rPr lang="it-IT" sz="2800" kern="1200" dirty="0" smtClean="0"/>
+            <a:t>Qualità in uso</a:t>
+          </a:r>
+          <a:endParaRPr lang="it-IT" sz="2800" kern="1200" dirty="0"/>
+        </a:p>
+      </dsp:txBody>
+      <dsp:txXfrm>
+        <a:off x="2447285" y="3073094"/>
+        <a:ext cx="1704657" cy="826611"/>
+      </dsp:txXfrm>
+    </dsp:sp>
+  </dsp:spTree>
+</dsp:drawing>
 </file>
 
 <file path=ppt/diagrams/layout1.xml><?xml version="1.0" encoding="utf-8"?>
@@ -2926,7 +3653,7 @@
             <a:fld id="{0106B4A3-4212-4E39-93DE-E053E8F69C28}" type="datetimeFigureOut">
               <a:rPr lang="en-US" smtClean="0"/>
               <a:pPr/>
-              <a:t>4/28/2016</a:t>
+              <a:t>05/05/16</a:t>
             </a:fld>
             <a:endParaRPr lang="en-US"/>
           </a:p>
@@ -2991,7 +3718,7 @@
             <a:fld id="{A3DCDF73-85D2-4237-9B32-053DBDB0C312}" type="slidenum">
               <a:rPr kumimoji="0" lang="en-US" smtClean="0"/>
               <a:pPr/>
-              <a:t>‹N›</a:t>
+              <a:t>‹#›</a:t>
             </a:fld>
             <a:endParaRPr kumimoji="0" lang="en-US"/>
           </a:p>
@@ -3115,7 +3842,7 @@
             <a:fld id="{0106B4A3-4212-4E39-93DE-E053E8F69C28}" type="datetimeFigureOut">
               <a:rPr lang="en-US" smtClean="0"/>
               <a:pPr/>
-              <a:t>4/28/2016</a:t>
+              <a:t>05/05/16</a:t>
             </a:fld>
             <a:endParaRPr lang="en-US"/>
           </a:p>
@@ -3158,7 +3885,7 @@
             <a:fld id="{A3DCDF73-85D2-4237-9B32-053DBDB0C312}" type="slidenum">
               <a:rPr kumimoji="0" lang="en-US" smtClean="0"/>
               <a:pPr/>
-              <a:t>‹N›</a:t>
+              <a:t>‹#›</a:t>
             </a:fld>
             <a:endParaRPr kumimoji="0" lang="en-US"/>
           </a:p>
@@ -3292,7 +4019,7 @@
             <a:fld id="{0106B4A3-4212-4E39-93DE-E053E8F69C28}" type="datetimeFigureOut">
               <a:rPr lang="en-US" smtClean="0"/>
               <a:pPr/>
-              <a:t>4/28/2016</a:t>
+              <a:t>05/05/16</a:t>
             </a:fld>
             <a:endParaRPr lang="en-US"/>
           </a:p>
@@ -3335,7 +4062,7 @@
             <a:fld id="{A3DCDF73-85D2-4237-9B32-053DBDB0C312}" type="slidenum">
               <a:rPr kumimoji="0" lang="en-US" smtClean="0"/>
               <a:pPr/>
-              <a:t>‹N›</a:t>
+              <a:t>‹#›</a:t>
             </a:fld>
             <a:endParaRPr kumimoji="0" lang="en-US"/>
           </a:p>
@@ -3474,7 +4201,7 @@
             <a:fld id="{0106B4A3-4212-4E39-93DE-E053E8F69C28}" type="datetimeFigureOut">
               <a:rPr lang="en-US" smtClean="0"/>
               <a:pPr/>
-              <a:t>4/28/2016</a:t>
+              <a:t>05/05/16</a:t>
             </a:fld>
             <a:endParaRPr lang="en-US"/>
           </a:p>
@@ -3522,7 +4249,7 @@
             <a:fld id="{A3DCDF73-85D2-4237-9B32-053DBDB0C312}" type="slidenum">
               <a:rPr kumimoji="0" lang="en-US" smtClean="0"/>
               <a:pPr/>
-              <a:t>‹N›</a:t>
+              <a:t>‹#›</a:t>
             </a:fld>
             <a:endParaRPr kumimoji="0" lang="en-US"/>
           </a:p>
@@ -3723,7 +4450,7 @@
             <a:fld id="{0106B4A3-4212-4E39-93DE-E053E8F69C28}" type="datetimeFigureOut">
               <a:rPr lang="en-US" smtClean="0"/>
               <a:pPr/>
-              <a:t>4/28/2016</a:t>
+              <a:t>05/05/16</a:t>
             </a:fld>
             <a:endParaRPr lang="en-US"/>
           </a:p>
@@ -3776,7 +4503,7 @@
             <a:fld id="{A3DCDF73-85D2-4237-9B32-053DBDB0C312}" type="slidenum">
               <a:rPr kumimoji="0" lang="en-US" smtClean="0"/>
               <a:pPr/>
-              <a:t>‹N›</a:t>
+              <a:t>‹#›</a:t>
             </a:fld>
             <a:endParaRPr kumimoji="0" lang="en-US"/>
           </a:p>
@@ -4199,7 +4926,7 @@
             <a:fld id="{0106B4A3-4212-4E39-93DE-E053E8F69C28}" type="datetimeFigureOut">
               <a:rPr lang="en-US" smtClean="0"/>
               <a:pPr/>
-              <a:t>4/28/2016</a:t>
+              <a:t>05/05/16</a:t>
             </a:fld>
             <a:endParaRPr lang="en-US"/>
           </a:p>
@@ -4252,7 +4979,7 @@
             <a:fld id="{A3DCDF73-85D2-4237-9B32-053DBDB0C312}" type="slidenum">
               <a:rPr kumimoji="0" lang="en-US" smtClean="0"/>
               <a:pPr/>
-              <a:t>‹N›</a:t>
+              <a:t>‹#›</a:t>
             </a:fld>
             <a:endParaRPr kumimoji="0" lang="en-US"/>
           </a:p>
@@ -4616,7 +5343,7 @@
             <a:fld id="{0106B4A3-4212-4E39-93DE-E053E8F69C28}" type="datetimeFigureOut">
               <a:rPr lang="en-US" smtClean="0"/>
               <a:pPr/>
-              <a:t>4/28/2016</a:t>
+              <a:t>05/05/16</a:t>
             </a:fld>
             <a:endParaRPr lang="en-US"/>
           </a:p>
@@ -4673,7 +5400,7 @@
             <a:fld id="{A3DCDF73-85D2-4237-9B32-053DBDB0C312}" type="slidenum">
               <a:rPr kumimoji="0" lang="en-US" smtClean="0"/>
               <a:pPr/>
-              <a:t>‹N›</a:t>
+              <a:t>‹#›</a:t>
             </a:fld>
             <a:endParaRPr kumimoji="0" lang="en-US"/>
           </a:p>
@@ -4749,7 +5476,7 @@
             <a:fld id="{0106B4A3-4212-4E39-93DE-E053E8F69C28}" type="datetimeFigureOut">
               <a:rPr lang="en-US" smtClean="0"/>
               <a:pPr/>
-              <a:t>4/28/2016</a:t>
+              <a:t>05/05/16</a:t>
             </a:fld>
             <a:endParaRPr lang="en-US"/>
           </a:p>
@@ -4792,7 +5519,7 @@
             <a:fld id="{A3DCDF73-85D2-4237-9B32-053DBDB0C312}" type="slidenum">
               <a:rPr kumimoji="0" lang="en-US" smtClean="0"/>
               <a:pPr/>
-              <a:t>‹N›</a:t>
+              <a:t>‹#›</a:t>
             </a:fld>
             <a:endParaRPr kumimoji="0" lang="en-US"/>
           </a:p>
@@ -4846,7 +5573,7 @@
             <a:fld id="{0106B4A3-4212-4E39-93DE-E053E8F69C28}" type="datetimeFigureOut">
               <a:rPr lang="en-US" smtClean="0"/>
               <a:pPr/>
-              <a:t>4/28/2016</a:t>
+              <a:t>05/05/16</a:t>
             </a:fld>
             <a:endParaRPr lang="en-US"/>
           </a:p>
@@ -4899,7 +5626,7 @@
             <a:fld id="{A3DCDF73-85D2-4237-9B32-053DBDB0C312}" type="slidenum">
               <a:rPr kumimoji="0" lang="en-US" smtClean="0"/>
               <a:pPr/>
-              <a:t>‹N›</a:t>
+              <a:t>‹#›</a:t>
             </a:fld>
             <a:endParaRPr kumimoji="0" lang="en-US"/>
           </a:p>
@@ -5126,7 +5853,7 @@
             <a:fld id="{0106B4A3-4212-4E39-93DE-E053E8F69C28}" type="datetimeFigureOut">
               <a:rPr lang="en-US" smtClean="0"/>
               <a:pPr/>
-              <a:t>4/28/2016</a:t>
+              <a:t>05/05/16</a:t>
             </a:fld>
             <a:endParaRPr lang="en-US"/>
           </a:p>
@@ -5187,7 +5914,7 @@
             <a:fld id="{A3DCDF73-85D2-4237-9B32-053DBDB0C312}" type="slidenum">
               <a:rPr kumimoji="0" lang="en-US" smtClean="0"/>
               <a:pPr/>
-              <a:t>‹N›</a:t>
+              <a:t>‹#›</a:t>
             </a:fld>
             <a:endParaRPr kumimoji="0" lang="en-US"/>
           </a:p>
@@ -5380,7 +6107,7 @@
             <a:fld id="{0106B4A3-4212-4E39-93DE-E053E8F69C28}" type="datetimeFigureOut">
               <a:rPr lang="en-US" smtClean="0"/>
               <a:pPr/>
-              <a:t>4/28/2016</a:t>
+              <a:t>05/05/16</a:t>
             </a:fld>
             <a:endParaRPr lang="en-US"/>
           </a:p>
@@ -5441,7 +6168,7 @@
             <a:fld id="{A3DCDF73-85D2-4237-9B32-053DBDB0C312}" type="slidenum">
               <a:rPr kumimoji="0" lang="en-US" smtClean="0"/>
               <a:pPr/>
-              <a:t>‹N›</a:t>
+              <a:t>‹#›</a:t>
             </a:fld>
             <a:endParaRPr kumimoji="0" lang="en-US"/>
           </a:p>
@@ -5754,7 +6481,7 @@
             <a:fld id="{0106B4A3-4212-4E39-93DE-E053E8F69C28}" type="datetimeFigureOut">
               <a:rPr lang="en-US" smtClean="0"/>
               <a:pPr/>
-              <a:t>4/28/2016</a:t>
+              <a:t>05/05/16</a:t>
             </a:fld>
             <a:endParaRPr lang="en-US"/>
           </a:p>
@@ -5829,7 +6556,7 @@
             <a:fld id="{A3DCDF73-85D2-4237-9B32-053DBDB0C312}" type="slidenum">
               <a:rPr kumimoji="0" lang="en-US" smtClean="0"/>
               <a:pPr/>
-              <a:t>‹N›</a:t>
+              <a:t>‹#›</a:t>
             </a:fld>
             <a:endParaRPr kumimoji="0" lang="en-US"/>
           </a:p>
@@ -6258,7 +6985,7 @@
   <p:timing>
     <p:tnLst>
       <p:par>
-        <p:cTn id="1" dur="indefinite" restart="never" nodeType="tmRoot"/>
+        <p:cTn xmlns:p14="http://schemas.microsoft.com/office/powerpoint/2010/main" id="1" dur="indefinite" restart="never" nodeType="tmRoot"/>
       </p:par>
     </p:tnLst>
   </p:timing>
@@ -6673,7 +7400,7 @@
   <p:timing>
     <p:tnLst>
       <p:par>
-        <p:cTn id="1" dur="indefinite" restart="never" nodeType="tmRoot">
+        <p:cTn xmlns:p14="http://schemas.microsoft.com/office/powerpoint/2010/main" id="1" dur="indefinite" restart="never" nodeType="tmRoot">
           <p:childTnLst>
             <p:seq concurrent="1" nextAc="seek">
               <p:cTn id="2" dur="indefinite" nodeType="mainSeq">
@@ -7335,7 +8062,7 @@
   <p:timing>
     <p:tnLst>
       <p:par>
-        <p:cTn id="1" dur="indefinite" restart="never" nodeType="tmRoot">
+        <p:cTn xmlns:p14="http://schemas.microsoft.com/office/powerpoint/2010/main" id="1" dur="indefinite" restart="never" nodeType="tmRoot">
           <p:childTnLst>
             <p:seq concurrent="1" nextAc="seek">
               <p:cTn id="2" dur="indefinite" nodeType="mainSeq">
@@ -7919,7 +8646,7 @@
   <p:timing>
     <p:tnLst>
       <p:par>
-        <p:cTn id="1" dur="indefinite" restart="never" nodeType="tmRoot">
+        <p:cTn xmlns:p14="http://schemas.microsoft.com/office/powerpoint/2010/main" id="1" dur="indefinite" restart="never" nodeType="tmRoot">
           <p:childTnLst>
             <p:seq concurrent="1" nextAc="seek">
               <p:cTn id="2" dur="indefinite" nodeType="mainSeq">
@@ -8460,7 +9187,7 @@
   <p:timing>
     <p:tnLst>
       <p:par>
-        <p:cTn id="1" dur="indefinite" restart="never" nodeType="tmRoot"/>
+        <p:cTn xmlns:p14="http://schemas.microsoft.com/office/powerpoint/2010/main" id="1" dur="indefinite" restart="never" nodeType="tmRoot"/>
       </p:par>
     </p:tnLst>
   </p:timing>
@@ -8589,70 +9316,36 @@
           </a:prstGeom>
         </p:spPr>
       </p:pic>
-      <p:sp>
-        <p:nvSpPr>
-          <p:cNvPr id="8" name="Rettangolo 7"/>
-          <p:cNvSpPr/>
+      <p:pic>
+        <p:nvPicPr>
+          <p:cNvPr id="2" name="Picture 1" descr="5.gif"/>
+          <p:cNvPicPr>
+            <a:picLocks noChangeAspect="1"/>
+          </p:cNvPicPr>
           <p:nvPr/>
-        </p:nvSpPr>
+        </p:nvPicPr>
+        <p:blipFill>
+          <a:blip r:embed="rId3">
+            <a:extLst>
+              <a:ext uri="{28A0092B-C50C-407E-A947-70E740481C1C}">
+                <a14:useLocalDpi xmlns:a14="http://schemas.microsoft.com/office/drawing/2010/main" val="0"/>
+              </a:ext>
+            </a:extLst>
+          </a:blip>
+          <a:stretch>
+            <a:fillRect/>
+          </a:stretch>
+        </p:blipFill>
         <p:spPr>
           <a:xfrm>
-            <a:off x="4286248" y="5357826"/>
-            <a:ext cx="714380" cy="214314"/>
+            <a:off x="4139952" y="4725144"/>
+            <a:ext cx="1296144" cy="1885300"/>
           </a:xfrm>
           <a:prstGeom prst="rect">
             <a:avLst/>
           </a:prstGeom>
-          <a:solidFill>
-            <a:schemeClr val="tx2">
-              <a:lumMod val="90000"/>
-            </a:schemeClr>
-          </a:solidFill>
-          <a:ln>
-            <a:solidFill>
-              <a:schemeClr val="tx2">
-                <a:lumMod val="90000"/>
-              </a:schemeClr>
-            </a:solidFill>
-          </a:ln>
-        </p:spPr>
-        <p:style>
-          <a:lnRef idx="2">
-            <a:schemeClr val="accent1">
-              <a:shade val="50000"/>
-            </a:schemeClr>
-          </a:lnRef>
-          <a:fillRef idx="1">
-            <a:schemeClr val="accent1"/>
-          </a:fillRef>
-          <a:effectRef idx="0">
-            <a:schemeClr val="accent1"/>
-          </a:effectRef>
-          <a:fontRef idx="minor">
-            <a:schemeClr val="lt1"/>
-          </a:fontRef>
-        </p:style>
-        <p:txBody>
-          <a:bodyPr rtlCol="0" anchor="ctr"/>
-          <a:lstStyle/>
-          <a:p>
-            <a:pPr algn="ctr"/>
-            <a:r>
-              <a:rPr lang="it-IT" dirty="0" smtClean="0">
-                <a:solidFill>
-                  <a:schemeClr val="bg1"/>
-                </a:solidFill>
-              </a:rPr>
-              <a:t>NO</a:t>
-            </a:r>
-            <a:endParaRPr lang="it-IT" dirty="0">
-              <a:solidFill>
-                <a:schemeClr val="bg1"/>
-              </a:solidFill>
-            </a:endParaRPr>
-          </a:p>
-        </p:txBody>
-      </p:sp>
+        </p:spPr>
+      </p:pic>
     </p:spTree>
   </p:cSld>
   <p:clrMapOvr>
@@ -8661,7 +9354,7 @@
   <p:timing>
     <p:tnLst>
       <p:par>
-        <p:cTn id="1" dur="indefinite" restart="never" nodeType="tmRoot">
+        <p:cTn xmlns:p14="http://schemas.microsoft.com/office/powerpoint/2010/main" id="1" dur="indefinite" restart="never" nodeType="tmRoot">
           <p:childTnLst>
             <p:seq concurrent="1" nextAc="seek">
               <p:cTn id="2" dur="indefinite" nodeType="mainSeq">
@@ -8705,21 +9398,39 @@
                                   </p:childTnLst>
                                 </p:cTn>
                               </p:par>
+                            </p:childTnLst>
+                          </p:cTn>
+                        </p:par>
+                      </p:childTnLst>
+                    </p:cTn>
+                  </p:par>
+                  <p:par>
+                    <p:cTn id="7" fill="hold">
+                      <p:stCondLst>
+                        <p:cond delay="indefinite"/>
+                      </p:stCondLst>
+                      <p:childTnLst>
+                        <p:par>
+                          <p:cTn id="8" fill="hold">
+                            <p:stCondLst>
+                              <p:cond delay="0"/>
+                            </p:stCondLst>
+                            <p:childTnLst>
                               <p:par>
-                                <p:cTn id="7" presetID="1" presetClass="entr" presetSubtype="0" fill="hold" grpId="0" nodeType="withEffect">
+                                <p:cTn id="9" presetID="16" presetClass="entr" presetSubtype="37" fill="hold" nodeType="clickEffect">
                                   <p:stCondLst>
                                     <p:cond delay="0"/>
                                   </p:stCondLst>
                                   <p:childTnLst>
                                     <p:set>
                                       <p:cBhvr>
-                                        <p:cTn id="8" dur="1" fill="hold">
+                                        <p:cTn id="10" dur="1" fill="hold">
                                           <p:stCondLst>
                                             <p:cond delay="0"/>
                                           </p:stCondLst>
                                         </p:cTn>
                                         <p:tgtEl>
-                                          <p:spTgt spid="8"/>
+                                          <p:spTgt spid="2"/>
                                         </p:tgtEl>
                                         <p:attrNameLst>
                                           <p:attrName>style.visibility</p:attrName>
@@ -8729,6 +9440,14 @@
                                         <p:strVal val="visible"/>
                                       </p:to>
                                     </p:set>
+                                    <p:animEffect transition="in" filter="barn(outVertical)">
+                                      <p:cBhvr>
+                                        <p:cTn id="11" dur="500"/>
+                                        <p:tgtEl>
+                                          <p:spTgt spid="2"/>
+                                        </p:tgtEl>
+                                      </p:cBhvr>
+                                    </p:animEffect>
                                   </p:childTnLst>
                                 </p:cTn>
                               </p:par>
@@ -8759,9 +9478,6 @@
         </p:cTn>
       </p:par>
     </p:tnLst>
-    <p:bldLst>
-      <p:bldP spid="8" grpId="0" animBg="1"/>
-    </p:bldLst>
   </p:timing>
 </p:sld>
 </file>
@@ -8938,7 +9654,7 @@
   <p:timing>
     <p:tnLst>
       <p:par>
-        <p:cTn id="1" dur="indefinite" restart="never" nodeType="tmRoot"/>
+        <p:cTn xmlns:p14="http://schemas.microsoft.com/office/powerpoint/2010/main" id="1" dur="indefinite" restart="never" nodeType="tmRoot"/>
       </p:par>
     </p:tnLst>
   </p:timing>
@@ -9236,7 +9952,7 @@
   <p:timing>
     <p:tnLst>
       <p:par>
-        <p:cTn id="1" dur="indefinite" restart="never" nodeType="tmRoot"/>
+        <p:cTn xmlns:p14="http://schemas.microsoft.com/office/powerpoint/2010/main" id="1" dur="indefinite" restart="never" nodeType="tmRoot"/>
       </p:par>
     </p:tnLst>
   </p:timing>
@@ -9589,7 +10305,7 @@
   <p:timing>
     <p:tnLst>
       <p:par>
-        <p:cTn id="1" dur="indefinite" restart="never" nodeType="tmRoot">
+        <p:cTn xmlns:p14="http://schemas.microsoft.com/office/powerpoint/2010/main" id="1" dur="indefinite" restart="never" nodeType="tmRoot">
           <p:childTnLst>
             <p:seq concurrent="1" nextAc="seek">
               <p:cTn id="2" dur="indefinite" nodeType="mainSeq">
@@ -9907,7 +10623,7 @@
   <p:timing>
     <p:tnLst>
       <p:par>
-        <p:cTn id="1" dur="indefinite" restart="never" nodeType="tmRoot">
+        <p:cTn xmlns:p14="http://schemas.microsoft.com/office/powerpoint/2010/main" id="1" dur="indefinite" restart="never" nodeType="tmRoot">
           <p:childTnLst>
             <p:seq concurrent="1" nextAc="seek">
               <p:cTn id="2" dur="indefinite" nodeType="mainSeq">
@@ -10215,7 +10931,7 @@
   <p:timing>
     <p:tnLst>
       <p:par>
-        <p:cTn id="1" dur="indefinite" restart="never" nodeType="tmRoot"/>
+        <p:cTn xmlns:p14="http://schemas.microsoft.com/office/powerpoint/2010/main" id="1" dur="indefinite" restart="never" nodeType="tmRoot"/>
       </p:par>
     </p:tnLst>
   </p:timing>
@@ -10662,7 +11378,7 @@
   <p:timing>
     <p:tnLst>
       <p:par>
-        <p:cTn id="1" dur="indefinite" restart="never" nodeType="tmRoot"/>
+        <p:cTn xmlns:p14="http://schemas.microsoft.com/office/powerpoint/2010/main" id="1" dur="indefinite" restart="never" nodeType="tmRoot"/>
       </p:par>
     </p:tnLst>
   </p:timing>
@@ -10909,7 +11625,7 @@
   <p:timing>
     <p:tnLst>
       <p:par>
-        <p:cTn id="1" dur="indefinite" restart="never" nodeType="tmRoot">
+        <p:cTn xmlns:p14="http://schemas.microsoft.com/office/powerpoint/2010/main" id="1" dur="indefinite" restart="never" nodeType="tmRoot">
           <p:childTnLst>
             <p:seq concurrent="1" nextAc="seek">
               <p:cTn id="2" dur="indefinite" nodeType="mainSeq">
@@ -11220,7 +11936,7 @@
   <p:timing>
     <p:tnLst>
       <p:par>
-        <p:cTn id="1" dur="indefinite" restart="never" nodeType="tmRoot">
+        <p:cTn xmlns:p14="http://schemas.microsoft.com/office/powerpoint/2010/main" id="1" dur="indefinite" restart="never" nodeType="tmRoot">
           <p:childTnLst>
             <p:seq concurrent="1" nextAc="seek">
               <p:cTn id="2" dur="indefinite" nodeType="mainSeq">
@@ -11336,16 +12052,18 @@
         <p:spPr>
           <a:xfrm>
             <a:off x="0" y="0"/>
-            <a:ext cx="9144000" cy="1399032"/>
+            <a:ext cx="8229600" cy="804052"/>
           </a:xfrm>
         </p:spPr>
         <p:txBody>
-          <a:bodyPr/>
+          <a:bodyPr>
+            <a:normAutofit/>
+          </a:bodyPr>
           <a:lstStyle/>
           <a:p>
             <a:r>
               <a:rPr lang="it-IT" b="1" dirty="0" smtClean="0"/>
-              <a:t>Linguaggio Imperativo Strutturato</a:t>
+              <a:t>Scelte stilistiche</a:t>
             </a:r>
             <a:endParaRPr lang="it-IT" b="1" dirty="0"/>
           </a:p>
@@ -11361,7 +12079,12 @@
             <p:ph idx="1"/>
           </p:nvPr>
         </p:nvSpPr>
-        <p:spPr/>
+        <p:spPr>
+          <a:xfrm>
+            <a:off x="500034" y="1357298"/>
+            <a:ext cx="8229600" cy="4572000"/>
+          </a:xfrm>
+        </p:spPr>
         <p:txBody>
           <a:bodyPr/>
           <a:lstStyle/>
@@ -11370,10 +12093,124 @@
               <a:buNone/>
             </a:pPr>
             <a:r>
-              <a:rPr lang="it-IT" dirty="0" smtClean="0"/>
-              <a:t>Esempio in  c</a:t>
-            </a:r>
-            <a:endParaRPr lang="it-IT" dirty="0"/>
+              <a:rPr lang="it-IT" dirty="0" smtClean="0">
+                <a:solidFill>
+                  <a:schemeClr val="bg1"/>
+                </a:solidFill>
+              </a:rPr>
+              <a:t>I programmatori </a:t>
+            </a:r>
+            <a:r>
+              <a:rPr lang="it-IT" u="sng" dirty="0" smtClean="0">
+                <a:solidFill>
+                  <a:schemeClr val="bg1"/>
+                </a:solidFill>
+              </a:rPr>
+              <a:t>possono scegliere quale stile adottare</a:t>
+            </a:r>
+            <a:r>
+              <a:rPr lang="it-IT" dirty="0" smtClean="0">
+                <a:solidFill>
+                  <a:schemeClr val="bg1"/>
+                </a:solidFill>
+              </a:rPr>
+              <a:t> durante la stesura del codice.</a:t>
+            </a:r>
+          </a:p>
+          <a:p>
+            <a:pPr>
+              <a:buNone/>
+            </a:pPr>
+            <a:r>
+              <a:rPr lang="it-IT" dirty="0" smtClean="0">
+                <a:solidFill>
+                  <a:schemeClr val="bg1"/>
+                </a:solidFill>
+              </a:rPr>
+              <a:t>Un </a:t>
+            </a:r>
+            <a:r>
+              <a:rPr lang="it-IT" b="1" u="sng" dirty="0" smtClean="0">
+                <a:solidFill>
+                  <a:srgbClr val="FFC000"/>
+                </a:solidFill>
+              </a:rPr>
+              <a:t>codice leggibile</a:t>
+            </a:r>
+            <a:r>
+              <a:rPr lang="it-IT" dirty="0" smtClean="0">
+                <a:solidFill>
+                  <a:schemeClr val="bg1"/>
+                </a:solidFill>
+              </a:rPr>
+              <a:t>, il più delle volte, </a:t>
+            </a:r>
+            <a:r>
+              <a:rPr lang="it-IT" b="1" u="sng" dirty="0" smtClean="0">
+                <a:solidFill>
+                  <a:srgbClr val="FFC000"/>
+                </a:solidFill>
+              </a:rPr>
+              <a:t>risulta più lungo.</a:t>
+            </a:r>
+          </a:p>
+          <a:p>
+            <a:pPr>
+              <a:buNone/>
+            </a:pPr>
+            <a:r>
+              <a:rPr lang="it-IT" dirty="0" smtClean="0">
+                <a:solidFill>
+                  <a:schemeClr val="bg1"/>
+                </a:solidFill>
+              </a:rPr>
+              <a:t>Se vogliamo avere un </a:t>
+            </a:r>
+            <a:r>
+              <a:rPr lang="it-IT" b="1" u="sng" dirty="0" smtClean="0">
+                <a:solidFill>
+                  <a:srgbClr val="00B0F0"/>
+                </a:solidFill>
+              </a:rPr>
+              <a:t>codice</a:t>
+            </a:r>
+            <a:r>
+              <a:rPr lang="it-IT" dirty="0" smtClean="0">
+                <a:solidFill>
+                  <a:schemeClr val="bg1"/>
+                </a:solidFill>
+              </a:rPr>
+              <a:t> più </a:t>
+            </a:r>
+            <a:r>
+              <a:rPr lang="it-IT" b="1" u="sng" dirty="0" smtClean="0">
+                <a:solidFill>
+                  <a:srgbClr val="00B0F0"/>
+                </a:solidFill>
+              </a:rPr>
+              <a:t>compatto</a:t>
+            </a:r>
+            <a:r>
+              <a:rPr lang="it-IT" dirty="0" smtClean="0">
+                <a:solidFill>
+                  <a:schemeClr val="bg1"/>
+                </a:solidFill>
+              </a:rPr>
+              <a:t> possiamo adottare sintassi specifiche </a:t>
+            </a:r>
+            <a:r>
+              <a:rPr lang="it-IT" b="1" u="sng" dirty="0" smtClean="0">
+                <a:solidFill>
+                  <a:srgbClr val="00B0F0"/>
+                </a:solidFill>
+              </a:rPr>
+              <a:t>a discapito della comprensibilità.</a:t>
+            </a:r>
+            <a:endParaRPr lang="it-IT" b="1" u="sng" dirty="0">
+              <a:solidFill>
+                <a:srgbClr val="00B0F0"/>
+              </a:solidFill>
+            </a:endParaRPr>
           </a:p>
         </p:txBody>
       </p:sp>
@@ -11385,7 +12222,7 @@
   <p:timing>
     <p:tnLst>
       <p:par>
-        <p:cTn id="1" dur="indefinite" restart="never" nodeType="tmRoot"/>
+        <p:cTn xmlns:p14="http://schemas.microsoft.com/office/powerpoint/2010/main" id="1" dur="indefinite" restart="never" nodeType="tmRoot"/>
       </p:par>
     </p:tnLst>
   </p:timing>
@@ -11431,35 +12268,585 @@
           <a:p>
             <a:r>
               <a:rPr lang="it-IT" b="1" dirty="0" smtClean="0"/>
-              <a:t>Linguaggio Imperativo orientato ad Oggetti</a:t>
+              <a:t>Linguaggio Imperativo Strutturato</a:t>
             </a:r>
             <a:endParaRPr lang="it-IT" b="1" dirty="0"/>
+          </a:p>
+        </p:txBody>
+      </p:sp>
+      <p:pic>
+        <p:nvPicPr>
+          <p:cNvPr id="4" name="Picture 3" descr="CodiceLungo.png"/>
+          <p:cNvPicPr>
+            <a:picLocks noChangeAspect="1"/>
+          </p:cNvPicPr>
+          <p:nvPr/>
+        </p:nvPicPr>
+        <p:blipFill>
+          <a:blip r:embed="rId2">
+            <a:extLst>
+              <a:ext uri="{28A0092B-C50C-407E-A947-70E740481C1C}">
+                <a14:useLocalDpi xmlns:a14="http://schemas.microsoft.com/office/drawing/2010/main" val="0"/>
+              </a:ext>
+            </a:extLst>
+          </a:blip>
+          <a:stretch>
+            <a:fillRect/>
+          </a:stretch>
+        </p:blipFill>
+        <p:spPr>
+          <a:xfrm>
+            <a:off x="467544" y="1412776"/>
+            <a:ext cx="3816424" cy="4178254"/>
+          </a:xfrm>
+          <a:prstGeom prst="rect">
+            <a:avLst/>
+          </a:prstGeom>
+        </p:spPr>
+      </p:pic>
+      <p:pic>
+        <p:nvPicPr>
+          <p:cNvPr id="6" name="Picture 5" descr="CodiceCorto.png"/>
+          <p:cNvPicPr>
+            <a:picLocks noChangeAspect="1"/>
+          </p:cNvPicPr>
+          <p:nvPr/>
+        </p:nvPicPr>
+        <p:blipFill>
+          <a:blip r:embed="rId3">
+            <a:extLst>
+              <a:ext uri="{28A0092B-C50C-407E-A947-70E740481C1C}">
+                <a14:useLocalDpi xmlns:a14="http://schemas.microsoft.com/office/drawing/2010/main" val="0"/>
+              </a:ext>
+            </a:extLst>
+          </a:blip>
+          <a:stretch>
+            <a:fillRect/>
+          </a:stretch>
+        </p:blipFill>
+        <p:spPr>
+          <a:xfrm>
+            <a:off x="2699792" y="5661248"/>
+            <a:ext cx="5843116" cy="1062385"/>
+          </a:xfrm>
+          <a:prstGeom prst="rect">
+            <a:avLst/>
+          </a:prstGeom>
+        </p:spPr>
+      </p:pic>
+      <p:sp>
+        <p:nvSpPr>
+          <p:cNvPr id="8" name="TextBox 7"/>
+          <p:cNvSpPr txBox="1"/>
+          <p:nvPr/>
+        </p:nvSpPr>
+        <p:spPr>
+          <a:xfrm>
+            <a:off x="4355976" y="1412776"/>
+            <a:ext cx="4176464" cy="1938992"/>
+          </a:xfrm>
+          <a:prstGeom prst="rect">
+            <a:avLst/>
+          </a:prstGeom>
+          <a:solidFill>
+            <a:schemeClr val="tx1"/>
+          </a:solidFill>
+          <a:ln>
+            <a:solidFill>
+              <a:srgbClr val="000000"/>
+            </a:solidFill>
+          </a:ln>
+        </p:spPr>
+        <p:txBody>
+          <a:bodyPr wrap="square" rtlCol="0">
+            <a:spAutoFit/>
+          </a:bodyPr>
+          <a:lstStyle/>
+          <a:p>
+            <a:r>
+              <a:rPr lang="en-US" sz="2000" dirty="0" smtClean="0">
+                <a:solidFill>
+                  <a:srgbClr val="000000"/>
+                </a:solidFill>
+              </a:rPr>
+              <a:t>In </a:t>
+            </a:r>
+            <a:r>
+              <a:rPr lang="en-US" sz="2000" dirty="0" err="1" smtClean="0">
+                <a:solidFill>
+                  <a:srgbClr val="000000"/>
+                </a:solidFill>
+              </a:rPr>
+              <a:t>questo</a:t>
+            </a:r>
+            <a:r>
+              <a:rPr lang="en-US" sz="2000" dirty="0" smtClean="0">
+                <a:solidFill>
+                  <a:srgbClr val="000000"/>
+                </a:solidFill>
+              </a:rPr>
+              <a:t> </a:t>
+            </a:r>
+            <a:r>
+              <a:rPr lang="en-US" sz="2000" dirty="0" err="1" smtClean="0">
+                <a:solidFill>
+                  <a:srgbClr val="000000"/>
+                </a:solidFill>
+              </a:rPr>
+              <a:t>codice</a:t>
+            </a:r>
+            <a:r>
+              <a:rPr lang="en-US" sz="2000" dirty="0" smtClean="0">
+                <a:solidFill>
+                  <a:srgbClr val="000000"/>
+                </a:solidFill>
+              </a:rPr>
+              <a:t>, </a:t>
+            </a:r>
+            <a:r>
+              <a:rPr lang="en-US" sz="2000" dirty="0" err="1" smtClean="0">
+                <a:solidFill>
+                  <a:srgbClr val="000000"/>
+                </a:solidFill>
+              </a:rPr>
+              <a:t>abbiamo</a:t>
+            </a:r>
+            <a:r>
+              <a:rPr lang="en-US" sz="2000" dirty="0" smtClean="0">
+                <a:solidFill>
+                  <a:srgbClr val="000000"/>
+                </a:solidFill>
+              </a:rPr>
+              <a:t> </a:t>
+            </a:r>
+            <a:r>
+              <a:rPr lang="en-US" sz="2000" dirty="0" err="1" smtClean="0">
+                <a:solidFill>
+                  <a:srgbClr val="000000"/>
+                </a:solidFill>
+              </a:rPr>
+              <a:t>una</a:t>
+            </a:r>
+            <a:r>
+              <a:rPr lang="en-US" sz="2000" dirty="0" smtClean="0">
+                <a:solidFill>
+                  <a:srgbClr val="000000"/>
+                </a:solidFill>
+              </a:rPr>
+              <a:t> </a:t>
+            </a:r>
+            <a:r>
+              <a:rPr lang="en-US" sz="2000" dirty="0" err="1" smtClean="0">
+                <a:solidFill>
+                  <a:srgbClr val="000000"/>
+                </a:solidFill>
+              </a:rPr>
+              <a:t>serie</a:t>
+            </a:r>
+            <a:r>
+              <a:rPr lang="en-US" sz="2000" dirty="0" smtClean="0">
+                <a:solidFill>
+                  <a:srgbClr val="000000"/>
+                </a:solidFill>
+              </a:rPr>
+              <a:t> di </a:t>
+            </a:r>
+            <a:r>
+              <a:rPr lang="en-US" sz="2000" dirty="0" err="1" smtClean="0">
+                <a:solidFill>
+                  <a:srgbClr val="000000"/>
+                </a:solidFill>
+              </a:rPr>
+              <a:t>fibonacci</a:t>
+            </a:r>
+            <a:r>
+              <a:rPr lang="en-US" sz="2000" dirty="0" smtClean="0">
+                <a:solidFill>
+                  <a:srgbClr val="000000"/>
+                </a:solidFill>
+              </a:rPr>
+              <a:t> </a:t>
+            </a:r>
+            <a:r>
+              <a:rPr lang="en-US" sz="2000" dirty="0" err="1" smtClean="0">
+                <a:solidFill>
+                  <a:srgbClr val="000000"/>
+                </a:solidFill>
+              </a:rPr>
+              <a:t>dei</a:t>
+            </a:r>
+            <a:r>
+              <a:rPr lang="en-US" sz="2000" dirty="0" smtClean="0">
+                <a:solidFill>
+                  <a:srgbClr val="000000"/>
+                </a:solidFill>
+              </a:rPr>
+              <a:t> </a:t>
+            </a:r>
+            <a:r>
+              <a:rPr lang="en-US" sz="2000" dirty="0" err="1" smtClean="0">
+                <a:solidFill>
+                  <a:srgbClr val="000000"/>
+                </a:solidFill>
+              </a:rPr>
+              <a:t>primi</a:t>
+            </a:r>
+            <a:r>
+              <a:rPr lang="en-US" sz="2000" dirty="0" smtClean="0">
+                <a:solidFill>
+                  <a:srgbClr val="000000"/>
+                </a:solidFill>
+              </a:rPr>
+              <a:t> 20 </a:t>
+            </a:r>
+            <a:r>
+              <a:rPr lang="en-US" sz="2000" dirty="0" err="1" smtClean="0">
+                <a:solidFill>
+                  <a:srgbClr val="000000"/>
+                </a:solidFill>
+              </a:rPr>
+              <a:t>numeri</a:t>
+            </a:r>
+            <a:r>
+              <a:rPr lang="en-US" sz="2000" dirty="0" smtClean="0">
+                <a:solidFill>
+                  <a:srgbClr val="000000"/>
+                </a:solidFill>
+              </a:rPr>
+              <a:t>.</a:t>
+            </a:r>
+          </a:p>
+          <a:p>
+            <a:r>
+              <a:rPr lang="en-US" sz="2000" dirty="0" err="1" smtClean="0">
+                <a:solidFill>
+                  <a:srgbClr val="000000"/>
+                </a:solidFill>
+              </a:rPr>
+              <a:t>Indentazione</a:t>
+            </a:r>
+            <a:r>
+              <a:rPr lang="en-US" sz="2000" dirty="0" smtClean="0">
+                <a:solidFill>
+                  <a:srgbClr val="000000"/>
+                </a:solidFill>
+              </a:rPr>
+              <a:t> e stile </a:t>
+            </a:r>
+            <a:r>
+              <a:rPr lang="en-US" sz="2000" dirty="0" err="1" smtClean="0">
+                <a:solidFill>
+                  <a:srgbClr val="000000"/>
+                </a:solidFill>
+              </a:rPr>
+              <a:t>fanno</a:t>
+            </a:r>
+            <a:r>
+              <a:rPr lang="en-US" sz="2000" dirty="0" smtClean="0">
+                <a:solidFill>
+                  <a:srgbClr val="000000"/>
+                </a:solidFill>
+              </a:rPr>
+              <a:t> </a:t>
+            </a:r>
+            <a:r>
+              <a:rPr lang="en-US" sz="2000" dirty="0" err="1" smtClean="0">
+                <a:solidFill>
+                  <a:srgbClr val="000000"/>
+                </a:solidFill>
+              </a:rPr>
+              <a:t>si</a:t>
+            </a:r>
+            <a:r>
+              <a:rPr lang="en-US" sz="2000" dirty="0" smtClean="0">
+                <a:solidFill>
+                  <a:srgbClr val="000000"/>
+                </a:solidFill>
+              </a:rPr>
+              <a:t> </a:t>
+            </a:r>
+            <a:r>
+              <a:rPr lang="en-US" sz="2000" dirty="0" err="1" smtClean="0">
+                <a:solidFill>
+                  <a:srgbClr val="000000"/>
+                </a:solidFill>
+              </a:rPr>
+              <a:t>che</a:t>
+            </a:r>
+            <a:r>
+              <a:rPr lang="en-US" sz="2000" dirty="0" smtClean="0">
+                <a:solidFill>
+                  <a:srgbClr val="000000"/>
+                </a:solidFill>
+              </a:rPr>
+              <a:t> </a:t>
+            </a:r>
+            <a:r>
+              <a:rPr lang="en-US" sz="2000" dirty="0" err="1" smtClean="0">
+                <a:solidFill>
+                  <a:srgbClr val="000000"/>
+                </a:solidFill>
+              </a:rPr>
+              <a:t>il</a:t>
+            </a:r>
+            <a:r>
+              <a:rPr lang="en-US" sz="2000" dirty="0" smtClean="0">
+                <a:solidFill>
+                  <a:srgbClr val="000000"/>
+                </a:solidFill>
+              </a:rPr>
+              <a:t> </a:t>
+            </a:r>
+            <a:r>
+              <a:rPr lang="en-US" sz="2000" dirty="0" err="1" smtClean="0">
+                <a:solidFill>
+                  <a:srgbClr val="000000"/>
+                </a:solidFill>
+              </a:rPr>
+              <a:t>codice</a:t>
+            </a:r>
+            <a:r>
+              <a:rPr lang="en-US" sz="2000" dirty="0" smtClean="0">
+                <a:solidFill>
+                  <a:srgbClr val="000000"/>
+                </a:solidFill>
+              </a:rPr>
+              <a:t> </a:t>
+            </a:r>
+            <a:r>
+              <a:rPr lang="en-US" sz="2000" dirty="0" err="1" smtClean="0">
+                <a:solidFill>
+                  <a:srgbClr val="000000"/>
+                </a:solidFill>
+              </a:rPr>
+              <a:t>risulti</a:t>
+            </a:r>
+            <a:r>
+              <a:rPr lang="en-US" sz="2000" dirty="0" smtClean="0">
+                <a:solidFill>
+                  <a:srgbClr val="000000"/>
+                </a:solidFill>
+              </a:rPr>
+              <a:t> </a:t>
+            </a:r>
+            <a:r>
+              <a:rPr lang="en-US" sz="2000" dirty="0" err="1" smtClean="0">
+                <a:solidFill>
+                  <a:srgbClr val="000000"/>
+                </a:solidFill>
+              </a:rPr>
+              <a:t>più</a:t>
+            </a:r>
+            <a:r>
+              <a:rPr lang="en-US" sz="2000" dirty="0" smtClean="0">
+                <a:solidFill>
+                  <a:srgbClr val="000000"/>
+                </a:solidFill>
+              </a:rPr>
+              <a:t> </a:t>
+            </a:r>
+            <a:r>
+              <a:rPr lang="en-US" sz="2000" dirty="0" err="1" smtClean="0">
+                <a:solidFill>
+                  <a:srgbClr val="000000"/>
+                </a:solidFill>
+              </a:rPr>
+              <a:t>ordinato</a:t>
+            </a:r>
+            <a:r>
+              <a:rPr lang="en-US" sz="2000" dirty="0">
+                <a:solidFill>
+                  <a:srgbClr val="000000"/>
+                </a:solidFill>
+              </a:rPr>
+              <a:t> </a:t>
+            </a:r>
+            <a:r>
+              <a:rPr lang="en-US" sz="2000" dirty="0" smtClean="0">
+                <a:solidFill>
+                  <a:srgbClr val="000000"/>
+                </a:solidFill>
+              </a:rPr>
+              <a:t>e </a:t>
+            </a:r>
+            <a:r>
+              <a:rPr lang="en-US" sz="2000" dirty="0" err="1" smtClean="0">
+                <a:solidFill>
+                  <a:srgbClr val="000000"/>
+                </a:solidFill>
+              </a:rPr>
+              <a:t>comprensibile</a:t>
+            </a:r>
+            <a:r>
+              <a:rPr lang="en-US" sz="2000" dirty="0">
+                <a:solidFill>
+                  <a:srgbClr val="000000"/>
+                </a:solidFill>
+              </a:rPr>
+              <a:t>.</a:t>
+            </a:r>
+            <a:endParaRPr lang="en-US" sz="2000" dirty="0" smtClean="0">
+              <a:solidFill>
+                <a:srgbClr val="000000"/>
+              </a:solidFill>
+            </a:endParaRPr>
           </a:p>
         </p:txBody>
       </p:sp>
       <p:sp>
         <p:nvSpPr>
-          <p:cNvPr id="3" name="Segnaposto contenuto 2"/>
-          <p:cNvSpPr>
-            <a:spLocks noGrp="1"/>
-          </p:cNvSpPr>
-          <p:nvPr>
-            <p:ph idx="1"/>
-          </p:nvPr>
+          <p:cNvPr id="9" name="TextBox 8"/>
+          <p:cNvSpPr txBox="1"/>
+          <p:nvPr/>
         </p:nvSpPr>
-        <p:spPr/>
+        <p:spPr>
+          <a:xfrm>
+            <a:off x="5364088" y="4293096"/>
+            <a:ext cx="3168352" cy="1323439"/>
+          </a:xfrm>
+          <a:prstGeom prst="rect">
+            <a:avLst/>
+          </a:prstGeom>
+          <a:solidFill>
+            <a:srgbClr val="FFFFFF"/>
+          </a:solidFill>
+          <a:ln>
+            <a:solidFill>
+              <a:srgbClr val="000000"/>
+            </a:solidFill>
+          </a:ln>
+        </p:spPr>
         <p:txBody>
-          <a:bodyPr/>
+          <a:bodyPr wrap="square" rtlCol="0">
+            <a:spAutoFit/>
+          </a:bodyPr>
           <a:lstStyle/>
           <a:p>
-            <a:pPr>
-              <a:buNone/>
-            </a:pPr>
-            <a:r>
-              <a:rPr lang="it-IT" dirty="0" smtClean="0"/>
-              <a:t>Esempio java</a:t>
-            </a:r>
-            <a:endParaRPr lang="it-IT" dirty="0"/>
+            <a:r>
+              <a:rPr lang="en-US" sz="2000" dirty="0" smtClean="0">
+                <a:solidFill>
+                  <a:srgbClr val="000000"/>
+                </a:solidFill>
+              </a:rPr>
+              <a:t>In </a:t>
+            </a:r>
+            <a:r>
+              <a:rPr lang="en-US" sz="2000" dirty="0" err="1" smtClean="0">
+                <a:solidFill>
+                  <a:srgbClr val="000000"/>
+                </a:solidFill>
+              </a:rPr>
+              <a:t>questa</a:t>
+            </a:r>
+            <a:r>
+              <a:rPr lang="en-US" sz="2000" dirty="0" smtClean="0">
+                <a:solidFill>
+                  <a:srgbClr val="000000"/>
+                </a:solidFill>
+              </a:rPr>
+              <a:t> </a:t>
+            </a:r>
+            <a:r>
+              <a:rPr lang="en-US" sz="2000" dirty="0" err="1" smtClean="0">
+                <a:solidFill>
+                  <a:srgbClr val="000000"/>
+                </a:solidFill>
+              </a:rPr>
+              <a:t>vediamo</a:t>
+            </a:r>
+            <a:r>
+              <a:rPr lang="en-US" sz="2000" dirty="0" smtClean="0">
+                <a:solidFill>
+                  <a:srgbClr val="000000"/>
+                </a:solidFill>
+              </a:rPr>
+              <a:t> lo </a:t>
+            </a:r>
+            <a:r>
+              <a:rPr lang="en-US" sz="2000" dirty="0" err="1" smtClean="0">
+                <a:solidFill>
+                  <a:srgbClr val="000000"/>
+                </a:solidFill>
+              </a:rPr>
+              <a:t>stesso</a:t>
+            </a:r>
+            <a:r>
+              <a:rPr lang="en-US" sz="2000" dirty="0" smtClean="0">
+                <a:solidFill>
+                  <a:srgbClr val="000000"/>
+                </a:solidFill>
+              </a:rPr>
+              <a:t> </a:t>
+            </a:r>
+            <a:r>
+              <a:rPr lang="en-US" sz="2000" dirty="0" err="1" smtClean="0">
+                <a:solidFill>
+                  <a:srgbClr val="000000"/>
+                </a:solidFill>
+              </a:rPr>
+              <a:t>codice</a:t>
+            </a:r>
+            <a:r>
+              <a:rPr lang="en-US" sz="2000" dirty="0" smtClean="0">
+                <a:solidFill>
+                  <a:srgbClr val="000000"/>
+                </a:solidFill>
+              </a:rPr>
+              <a:t> </a:t>
+            </a:r>
+            <a:r>
+              <a:rPr lang="en-US" sz="2000" dirty="0" err="1" smtClean="0">
+                <a:solidFill>
+                  <a:srgbClr val="000000"/>
+                </a:solidFill>
+              </a:rPr>
+              <a:t>sviluppato</a:t>
+            </a:r>
+            <a:r>
+              <a:rPr lang="en-US" sz="2000" dirty="0" smtClean="0">
+                <a:solidFill>
+                  <a:srgbClr val="000000"/>
+                </a:solidFill>
+              </a:rPr>
+              <a:t> con </a:t>
+            </a:r>
+            <a:r>
+              <a:rPr lang="en-US" sz="2000" dirty="0" err="1" smtClean="0">
+                <a:solidFill>
+                  <a:srgbClr val="000000"/>
+                </a:solidFill>
+              </a:rPr>
+              <a:t>scelte</a:t>
+            </a:r>
+            <a:r>
+              <a:rPr lang="en-US" sz="2000" dirty="0" smtClean="0">
+                <a:solidFill>
+                  <a:srgbClr val="000000"/>
+                </a:solidFill>
+              </a:rPr>
+              <a:t> </a:t>
+            </a:r>
+            <a:r>
+              <a:rPr lang="en-US" sz="2000" dirty="0" err="1" smtClean="0">
+                <a:solidFill>
+                  <a:srgbClr val="000000"/>
+                </a:solidFill>
+              </a:rPr>
+              <a:t>stilistiche</a:t>
+            </a:r>
+            <a:r>
+              <a:rPr lang="en-US" sz="2000" dirty="0" smtClean="0">
+                <a:solidFill>
+                  <a:srgbClr val="000000"/>
+                </a:solidFill>
+              </a:rPr>
+              <a:t> diverse.</a:t>
+            </a:r>
+            <a:endParaRPr lang="en-US" sz="2000" dirty="0">
+              <a:solidFill>
+                <a:srgbClr val="000000"/>
+              </a:solidFill>
+            </a:endParaRPr>
           </a:p>
         </p:txBody>
       </p:sp>
@@ -11468,6 +12855,216 @@
   <p:clrMapOvr>
     <a:masterClrMapping/>
   </p:clrMapOvr>
+  <p:timing>
+    <p:tnLst>
+      <p:par>
+        <p:cTn xmlns:p14="http://schemas.microsoft.com/office/powerpoint/2010/main" id="1" dur="indefinite" restart="never" nodeType="tmRoot">
+          <p:childTnLst>
+            <p:seq concurrent="1" nextAc="seek">
+              <p:cTn id="2" dur="indefinite" nodeType="mainSeq">
+                <p:childTnLst>
+                  <p:par>
+                    <p:cTn id="3" fill="hold">
+                      <p:stCondLst>
+                        <p:cond delay="indefinite"/>
+                      </p:stCondLst>
+                      <p:childTnLst>
+                        <p:par>
+                          <p:cTn id="4" fill="hold">
+                            <p:stCondLst>
+                              <p:cond delay="0"/>
+                            </p:stCondLst>
+                            <p:childTnLst>
+                              <p:par>
+                                <p:cTn id="5" presetID="3" presetClass="entr" presetSubtype="10" fill="hold" nodeType="clickEffect">
+                                  <p:stCondLst>
+                                    <p:cond delay="0"/>
+                                  </p:stCondLst>
+                                  <p:childTnLst>
+                                    <p:set>
+                                      <p:cBhvr>
+                                        <p:cTn id="6" dur="1" fill="hold">
+                                          <p:stCondLst>
+                                            <p:cond delay="0"/>
+                                          </p:stCondLst>
+                                        </p:cTn>
+                                        <p:tgtEl>
+                                          <p:spTgt spid="4"/>
+                                        </p:tgtEl>
+                                        <p:attrNameLst>
+                                          <p:attrName>style.visibility</p:attrName>
+                                        </p:attrNameLst>
+                                      </p:cBhvr>
+                                      <p:to>
+                                        <p:strVal val="visible"/>
+                                      </p:to>
+                                    </p:set>
+                                    <p:animEffect transition="in" filter="blinds(horizontal)">
+                                      <p:cBhvr>
+                                        <p:cTn id="7" dur="500"/>
+                                        <p:tgtEl>
+                                          <p:spTgt spid="4"/>
+                                        </p:tgtEl>
+                                      </p:cBhvr>
+                                    </p:animEffect>
+                                  </p:childTnLst>
+                                </p:cTn>
+                              </p:par>
+                              <p:par>
+                                <p:cTn id="8" presetID="3" presetClass="entr" presetSubtype="10" fill="hold" grpId="0" nodeType="withEffect">
+                                  <p:stCondLst>
+                                    <p:cond delay="0"/>
+                                  </p:stCondLst>
+                                  <p:childTnLst>
+                                    <p:set>
+                                      <p:cBhvr>
+                                        <p:cTn id="9" dur="1" fill="hold">
+                                          <p:stCondLst>
+                                            <p:cond delay="0"/>
+                                          </p:stCondLst>
+                                        </p:cTn>
+                                        <p:tgtEl>
+                                          <p:spTgt spid="8"/>
+                                        </p:tgtEl>
+                                        <p:attrNameLst>
+                                          <p:attrName>style.visibility</p:attrName>
+                                        </p:attrNameLst>
+                                      </p:cBhvr>
+                                      <p:to>
+                                        <p:strVal val="visible"/>
+                                      </p:to>
+                                    </p:set>
+                                    <p:animEffect transition="in" filter="blinds(horizontal)">
+                                      <p:cBhvr>
+                                        <p:cTn id="10" dur="500"/>
+                                        <p:tgtEl>
+                                          <p:spTgt spid="8"/>
+                                        </p:tgtEl>
+                                      </p:cBhvr>
+                                    </p:animEffect>
+                                  </p:childTnLst>
+                                </p:cTn>
+                              </p:par>
+                            </p:childTnLst>
+                          </p:cTn>
+                        </p:par>
+                      </p:childTnLst>
+                    </p:cTn>
+                  </p:par>
+                  <p:par>
+                    <p:cTn id="11" fill="hold">
+                      <p:stCondLst>
+                        <p:cond delay="indefinite"/>
+                      </p:stCondLst>
+                      <p:childTnLst>
+                        <p:par>
+                          <p:cTn id="12" fill="hold">
+                            <p:stCondLst>
+                              <p:cond delay="0"/>
+                            </p:stCondLst>
+                            <p:childTnLst>
+                              <p:par>
+                                <p:cTn id="13" presetID="3" presetClass="entr" presetSubtype="5" fill="hold" nodeType="clickEffect">
+                                  <p:stCondLst>
+                                    <p:cond delay="0"/>
+                                  </p:stCondLst>
+                                  <p:childTnLst>
+                                    <p:set>
+                                      <p:cBhvr>
+                                        <p:cTn id="14" dur="1" fill="hold">
+                                          <p:stCondLst>
+                                            <p:cond delay="0"/>
+                                          </p:stCondLst>
+                                        </p:cTn>
+                                        <p:tgtEl>
+                                          <p:spTgt spid="6"/>
+                                        </p:tgtEl>
+                                        <p:attrNameLst>
+                                          <p:attrName>style.visibility</p:attrName>
+                                        </p:attrNameLst>
+                                      </p:cBhvr>
+                                      <p:to>
+                                        <p:strVal val="visible"/>
+                                      </p:to>
+                                    </p:set>
+                                    <p:animEffect transition="in" filter="blinds(vertical)">
+                                      <p:cBhvr>
+                                        <p:cTn id="15" dur="500"/>
+                                        <p:tgtEl>
+                                          <p:spTgt spid="6"/>
+                                        </p:tgtEl>
+                                      </p:cBhvr>
+                                    </p:animEffect>
+                                  </p:childTnLst>
+                                </p:cTn>
+                              </p:par>
+                              <p:par>
+                                <p:cTn id="16" presetID="3" presetClass="entr" presetSubtype="5" fill="hold" grpId="0" nodeType="withEffect">
+                                  <p:stCondLst>
+                                    <p:cond delay="0"/>
+                                  </p:stCondLst>
+                                  <p:childTnLst>
+                                    <p:set>
+                                      <p:cBhvr>
+                                        <p:cTn id="17" dur="1" fill="hold">
+                                          <p:stCondLst>
+                                            <p:cond delay="0"/>
+                                          </p:stCondLst>
+                                        </p:cTn>
+                                        <p:tgtEl>
+                                          <p:spTgt spid="9"/>
+                                        </p:tgtEl>
+                                        <p:attrNameLst>
+                                          <p:attrName>style.visibility</p:attrName>
+                                        </p:attrNameLst>
+                                      </p:cBhvr>
+                                      <p:to>
+                                        <p:strVal val="visible"/>
+                                      </p:to>
+                                    </p:set>
+                                    <p:animEffect transition="in" filter="blinds(vertical)">
+                                      <p:cBhvr>
+                                        <p:cTn id="18" dur="500"/>
+                                        <p:tgtEl>
+                                          <p:spTgt spid="9"/>
+                                        </p:tgtEl>
+                                      </p:cBhvr>
+                                    </p:animEffect>
+                                  </p:childTnLst>
+                                </p:cTn>
+                              </p:par>
+                            </p:childTnLst>
+                          </p:cTn>
+                        </p:par>
+                      </p:childTnLst>
+                    </p:cTn>
+                  </p:par>
+                </p:childTnLst>
+              </p:cTn>
+              <p:prevCondLst>
+                <p:cond evt="onPrev" delay="0">
+                  <p:tgtEl>
+                    <p:sldTgt/>
+                  </p:tgtEl>
+                </p:cond>
+              </p:prevCondLst>
+              <p:nextCondLst>
+                <p:cond evt="onNext" delay="0">
+                  <p:tgtEl>
+                    <p:sldTgt/>
+                  </p:tgtEl>
+                </p:cond>
+              </p:nextCondLst>
+            </p:seq>
+          </p:childTnLst>
+        </p:cTn>
+      </p:par>
+    </p:tnLst>
+    <p:bldLst>
+      <p:bldP spid="8" grpId="0" animBg="1"/>
+      <p:bldP spid="9" grpId="0" animBg="1"/>
+    </p:bldLst>
+  </p:timing>
 </p:sld>
 </file>
 
@@ -11501,7 +13098,7 @@
         <p:spPr>
           <a:xfrm>
             <a:off x="0" y="0"/>
-            <a:ext cx="8229600" cy="785794"/>
+            <a:ext cx="9144000" cy="1399032"/>
           </a:xfrm>
         </p:spPr>
         <p:txBody>
@@ -11510,39 +13107,377 @@
           <a:p>
             <a:r>
               <a:rPr lang="it-IT" b="1" dirty="0" smtClean="0"/>
-              <a:t>Linguaggio Funzionale</a:t>
+              <a:t>Linguaggio Imperativo orientato ad Oggetti</a:t>
             </a:r>
             <a:endParaRPr lang="it-IT" b="1" dirty="0"/>
+          </a:p>
+        </p:txBody>
+      </p:sp>
+      <p:pic>
+        <p:nvPicPr>
+          <p:cNvPr id="5" name="Picture 4" descr="Senza titolo.1.tiff"/>
+          <p:cNvPicPr>
+            <a:picLocks noChangeAspect="1"/>
+          </p:cNvPicPr>
+          <p:nvPr/>
+        </p:nvPicPr>
+        <p:blipFill>
+          <a:blip r:embed="rId2">
+            <a:extLst>
+              <a:ext uri="{28A0092B-C50C-407E-A947-70E740481C1C}">
+                <a14:useLocalDpi xmlns:a14="http://schemas.microsoft.com/office/drawing/2010/main" val="0"/>
+              </a:ext>
+            </a:extLst>
+          </a:blip>
+          <a:stretch>
+            <a:fillRect/>
+          </a:stretch>
+        </p:blipFill>
+        <p:spPr>
+          <a:xfrm>
+            <a:off x="4427984" y="1052736"/>
+            <a:ext cx="3240360" cy="2664296"/>
+          </a:xfrm>
+          <a:prstGeom prst="rect">
+            <a:avLst/>
+          </a:prstGeom>
+          <a:ln w="76200" cmpd="sng">
+            <a:solidFill>
+              <a:srgbClr val="008000"/>
+            </a:solidFill>
+          </a:ln>
+        </p:spPr>
+      </p:pic>
+      <p:pic>
+        <p:nvPicPr>
+          <p:cNvPr id="6" name="Picture 5" descr="Senza titolo 2.1.tiff"/>
+          <p:cNvPicPr>
+            <a:picLocks noChangeAspect="1"/>
+          </p:cNvPicPr>
+          <p:nvPr/>
+        </p:nvPicPr>
+        <p:blipFill>
+          <a:blip r:embed="rId3">
+            <a:extLst>
+              <a:ext uri="{28A0092B-C50C-407E-A947-70E740481C1C}">
+                <a14:useLocalDpi xmlns:a14="http://schemas.microsoft.com/office/drawing/2010/main" val="0"/>
+              </a:ext>
+            </a:extLst>
+          </a:blip>
+          <a:stretch>
+            <a:fillRect/>
+          </a:stretch>
+        </p:blipFill>
+        <p:spPr>
+          <a:xfrm>
+            <a:off x="4427984" y="3933056"/>
+            <a:ext cx="4438418" cy="2736304"/>
+          </a:xfrm>
+          <a:prstGeom prst="rect">
+            <a:avLst/>
+          </a:prstGeom>
+          <a:ln w="76200" cmpd="sng">
+            <a:solidFill>
+              <a:srgbClr val="FFFF00"/>
+            </a:solidFill>
+          </a:ln>
+        </p:spPr>
+      </p:pic>
+      <p:pic>
+        <p:nvPicPr>
+          <p:cNvPr id="7" name="Picture 6" descr="Senza titolo 3.1.tiff"/>
+          <p:cNvPicPr>
+            <a:picLocks noChangeAspect="1"/>
+          </p:cNvPicPr>
+          <p:nvPr/>
+        </p:nvPicPr>
+        <p:blipFill>
+          <a:blip r:embed="rId4">
+            <a:extLst>
+              <a:ext uri="{28A0092B-C50C-407E-A947-70E740481C1C}">
+                <a14:useLocalDpi xmlns:a14="http://schemas.microsoft.com/office/drawing/2010/main" val="0"/>
+              </a:ext>
+            </a:extLst>
+          </a:blip>
+          <a:stretch>
+            <a:fillRect/>
+          </a:stretch>
+        </p:blipFill>
+        <p:spPr>
+          <a:xfrm>
+            <a:off x="323528" y="1772816"/>
+            <a:ext cx="3888299" cy="4968552"/>
+          </a:xfrm>
+          <a:prstGeom prst="rect">
+            <a:avLst/>
+          </a:prstGeom>
+          <a:ln w="76200" cmpd="sng">
+            <a:solidFill>
+              <a:srgbClr val="FF0000"/>
+            </a:solidFill>
+          </a:ln>
+        </p:spPr>
+      </p:pic>
+      <p:sp>
+        <p:nvSpPr>
+          <p:cNvPr id="8" name="TextBox 7"/>
+          <p:cNvSpPr txBox="1"/>
+          <p:nvPr/>
+        </p:nvSpPr>
+        <p:spPr>
+          <a:xfrm>
+            <a:off x="7884368" y="1412776"/>
+            <a:ext cx="1080120" cy="523220"/>
+          </a:xfrm>
+          <a:prstGeom prst="rect">
+            <a:avLst/>
+          </a:prstGeom>
+          <a:noFill/>
+        </p:spPr>
+        <p:txBody>
+          <a:bodyPr wrap="square" rtlCol="0">
+            <a:spAutoFit/>
+          </a:bodyPr>
+          <a:lstStyle/>
+          <a:p>
+            <a:pPr algn="ctr"/>
+            <a:r>
+              <a:rPr lang="en-US" sz="1400" dirty="0" err="1" smtClean="0"/>
+              <a:t>Classe</a:t>
+            </a:r>
+            <a:r>
+              <a:rPr lang="en-US" sz="1400" dirty="0" smtClean="0"/>
+              <a:t> Persona</a:t>
+            </a:r>
+            <a:endParaRPr lang="en-US" sz="1400" dirty="0"/>
           </a:p>
         </p:txBody>
       </p:sp>
       <p:sp>
         <p:nvSpPr>
-          <p:cNvPr id="3" name="Segnaposto contenuto 2"/>
-          <p:cNvSpPr>
-            <a:spLocks noGrp="1"/>
-          </p:cNvSpPr>
-          <p:nvPr>
-            <p:ph idx="1"/>
-          </p:nvPr>
+          <p:cNvPr id="9" name="TextBox 8"/>
+          <p:cNvSpPr txBox="1"/>
+          <p:nvPr/>
         </p:nvSpPr>
-        <p:spPr/>
+        <p:spPr>
+          <a:xfrm>
+            <a:off x="7884368" y="2276872"/>
+            <a:ext cx="1080120" cy="307777"/>
+          </a:xfrm>
+          <a:prstGeom prst="rect">
+            <a:avLst/>
+          </a:prstGeom>
+          <a:noFill/>
+        </p:spPr>
         <p:txBody>
-          <a:bodyPr/>
+          <a:bodyPr wrap="square" rtlCol="0">
+            <a:spAutoFit/>
+          </a:bodyPr>
           <a:lstStyle/>
           <a:p>
-            <a:pPr>
-              <a:buNone/>
-            </a:pPr>
-            <a:r>
-              <a:rPr lang="it-IT" dirty="0" smtClean="0"/>
-              <a:t>Esempio </a:t>
-            </a:r>
-            <a:r>
-              <a:rPr lang="it-IT" dirty="0" err="1" smtClean="0"/>
-              <a:t>ocaml</a:t>
-            </a:r>
-            <a:endParaRPr lang="it-IT" dirty="0"/>
+            <a:pPr algn="ctr"/>
+            <a:r>
+              <a:rPr lang="en-US" sz="1400" dirty="0" err="1" smtClean="0"/>
+              <a:t>Studente</a:t>
+            </a:r>
+            <a:r>
+              <a:rPr lang="en-US" sz="1400" dirty="0" smtClean="0"/>
+              <a:t> </a:t>
+            </a:r>
+            <a:endParaRPr lang="en-US" dirty="0"/>
+          </a:p>
+        </p:txBody>
+      </p:sp>
+      <p:sp>
+        <p:nvSpPr>
+          <p:cNvPr id="10" name="TextBox 9"/>
+          <p:cNvSpPr txBox="1"/>
+          <p:nvPr/>
+        </p:nvSpPr>
+        <p:spPr>
+          <a:xfrm>
+            <a:off x="7884368" y="2996952"/>
+            <a:ext cx="1111672" cy="646331"/>
+          </a:xfrm>
+          <a:prstGeom prst="rect">
+            <a:avLst/>
+          </a:prstGeom>
+          <a:noFill/>
+        </p:spPr>
+        <p:txBody>
+          <a:bodyPr wrap="square" rtlCol="0">
+            <a:spAutoFit/>
+          </a:bodyPr>
+          <a:lstStyle/>
+          <a:p>
+            <a:pPr algn="ctr"/>
+            <a:r>
+              <a:rPr lang="en-US" sz="1200" dirty="0" err="1" smtClean="0"/>
+              <a:t>Studente</a:t>
+            </a:r>
+            <a:r>
+              <a:rPr lang="en-US" sz="1200" dirty="0" smtClean="0"/>
+              <a:t> </a:t>
+            </a:r>
+            <a:r>
+              <a:rPr lang="en-US" sz="1200" dirty="0" err="1" smtClean="0"/>
+              <a:t>che</a:t>
+            </a:r>
+            <a:r>
+              <a:rPr lang="en-US" sz="1200" dirty="0" smtClean="0"/>
+              <a:t> </a:t>
+            </a:r>
+            <a:r>
+              <a:rPr lang="en-US" sz="1200" dirty="0" err="1" smtClean="0"/>
+              <a:t>sfutta</a:t>
+            </a:r>
+            <a:r>
+              <a:rPr lang="en-US" sz="1200" dirty="0" smtClean="0"/>
+              <a:t> </a:t>
+            </a:r>
+            <a:r>
+              <a:rPr lang="en-US" sz="1200" dirty="0" err="1" smtClean="0"/>
+              <a:t>ereditarietà</a:t>
+            </a:r>
+            <a:endParaRPr lang="en-US" sz="1200" dirty="0"/>
+          </a:p>
+        </p:txBody>
+      </p:sp>
+      <p:sp>
+        <p:nvSpPr>
+          <p:cNvPr id="11" name="Rectangle 10"/>
+          <p:cNvSpPr/>
+          <p:nvPr/>
+        </p:nvSpPr>
+        <p:spPr>
+          <a:xfrm>
+            <a:off x="7956376" y="1196752"/>
+            <a:ext cx="936104" cy="216024"/>
+          </a:xfrm>
+          <a:prstGeom prst="rect">
+            <a:avLst/>
+          </a:prstGeom>
+          <a:solidFill>
+            <a:srgbClr val="008000"/>
+          </a:solidFill>
+          <a:ln>
+            <a:solidFill>
+              <a:schemeClr val="bg1"/>
+            </a:solidFill>
+          </a:ln>
+        </p:spPr>
+        <p:style>
+          <a:lnRef idx="1">
+            <a:schemeClr val="accent1"/>
+          </a:lnRef>
+          <a:fillRef idx="3">
+            <a:schemeClr val="accent1"/>
+          </a:fillRef>
+          <a:effectRef idx="2">
+            <a:schemeClr val="accent1"/>
+          </a:effectRef>
+          <a:fontRef idx="minor">
+            <a:schemeClr val="lt1"/>
+          </a:fontRef>
+        </p:style>
+        <p:txBody>
+          <a:bodyPr rtlCol="0" anchor="ctr"/>
+          <a:lstStyle/>
+          <a:p>
+            <a:pPr algn="ctr"/>
+            <a:endParaRPr lang="en-US" dirty="0"/>
+          </a:p>
+        </p:txBody>
+      </p:sp>
+      <p:sp>
+        <p:nvSpPr>
+          <p:cNvPr id="12" name="Rectangle 11"/>
+          <p:cNvSpPr/>
+          <p:nvPr/>
+        </p:nvSpPr>
+        <p:spPr>
+          <a:xfrm>
+            <a:off x="7956376" y="2060848"/>
+            <a:ext cx="936104" cy="216024"/>
+          </a:xfrm>
+          <a:prstGeom prst="rect">
+            <a:avLst/>
+          </a:prstGeom>
+          <a:solidFill>
+            <a:srgbClr val="FF0000"/>
+          </a:solidFill>
+          <a:ln>
+            <a:solidFill>
+              <a:schemeClr val="bg1"/>
+            </a:solidFill>
+          </a:ln>
+        </p:spPr>
+        <p:style>
+          <a:lnRef idx="1">
+            <a:schemeClr val="accent1"/>
+          </a:lnRef>
+          <a:fillRef idx="3">
+            <a:schemeClr val="accent1"/>
+          </a:fillRef>
+          <a:effectRef idx="2">
+            <a:schemeClr val="accent1"/>
+          </a:effectRef>
+          <a:fontRef idx="minor">
+            <a:schemeClr val="lt1"/>
+          </a:fontRef>
+        </p:style>
+        <p:txBody>
+          <a:bodyPr rtlCol="0" anchor="ctr"/>
+          <a:lstStyle/>
+          <a:p>
+            <a:pPr algn="ctr"/>
+            <a:endParaRPr lang="en-US" dirty="0"/>
+          </a:p>
+        </p:txBody>
+      </p:sp>
+      <p:sp>
+        <p:nvSpPr>
+          <p:cNvPr id="13" name="Rectangle 12"/>
+          <p:cNvSpPr/>
+          <p:nvPr/>
+        </p:nvSpPr>
+        <p:spPr>
+          <a:xfrm>
+            <a:off x="7956376" y="2780928"/>
+            <a:ext cx="936104" cy="216024"/>
+          </a:xfrm>
+          <a:prstGeom prst="rect">
+            <a:avLst/>
+          </a:prstGeom>
+          <a:solidFill>
+            <a:srgbClr val="FFFF00"/>
+          </a:solidFill>
+          <a:ln>
+            <a:solidFill>
+              <a:schemeClr val="bg1"/>
+            </a:solidFill>
+          </a:ln>
+        </p:spPr>
+        <p:style>
+          <a:lnRef idx="1">
+            <a:schemeClr val="accent1"/>
+          </a:lnRef>
+          <a:fillRef idx="3">
+            <a:schemeClr val="accent1"/>
+          </a:fillRef>
+          <a:effectRef idx="2">
+            <a:schemeClr val="accent1"/>
+          </a:effectRef>
+          <a:fontRef idx="minor">
+            <a:schemeClr val="lt1"/>
+          </a:fontRef>
+        </p:style>
+        <p:txBody>
+          <a:bodyPr rtlCol="0" anchor="ctr"/>
+          <a:lstStyle/>
+          <a:p>
+            <a:pPr algn="ctr"/>
+            <a:endParaRPr lang="en-US" dirty="0"/>
           </a:p>
         </p:txBody>
       </p:sp>
@@ -11551,6 +13486,13 @@
   <p:clrMapOvr>
     <a:masterClrMapping/>
   </p:clrMapOvr>
+  <p:timing>
+    <p:tnLst>
+      <p:par>
+        <p:cTn xmlns:p14="http://schemas.microsoft.com/office/powerpoint/2010/main" id="1" dur="indefinite" restart="never" nodeType="tmRoot"/>
+      </p:par>
+    </p:tnLst>
+  </p:timing>
 </p:sld>
 </file>
 
@@ -11584,163 +13526,521 @@
         <p:spPr>
           <a:xfrm>
             <a:off x="0" y="0"/>
-            <a:ext cx="8229600" cy="804052"/>
+            <a:ext cx="8229600" cy="785794"/>
           </a:xfrm>
         </p:spPr>
         <p:txBody>
-          <a:bodyPr>
-            <a:normAutofit/>
+          <a:bodyPr/>
+          <a:lstStyle/>
+          <a:p>
+            <a:r>
+              <a:rPr lang="it-IT" b="1" dirty="0" smtClean="0"/>
+              <a:t>Linguaggio Funzionale</a:t>
+            </a:r>
+            <a:endParaRPr lang="it-IT" b="1" dirty="0"/>
+          </a:p>
+        </p:txBody>
+      </p:sp>
+      <p:pic>
+        <p:nvPicPr>
+          <p:cNvPr id="5" name="Picture 4" descr="Senza titolo.tiff"/>
+          <p:cNvPicPr>
+            <a:picLocks noChangeAspect="1"/>
+          </p:cNvPicPr>
+          <p:nvPr/>
+        </p:nvPicPr>
+        <p:blipFill>
+          <a:blip r:embed="rId2">
+            <a:extLst>
+              <a:ext uri="{28A0092B-C50C-407E-A947-70E740481C1C}">
+                <a14:useLocalDpi xmlns:a14="http://schemas.microsoft.com/office/drawing/2010/main" val="0"/>
+              </a:ext>
+            </a:extLst>
+          </a:blip>
+          <a:stretch>
+            <a:fillRect/>
+          </a:stretch>
+        </p:blipFill>
+        <p:spPr>
+          <a:xfrm>
+            <a:off x="539552" y="1124744"/>
+            <a:ext cx="3822700" cy="1435100"/>
+          </a:xfrm>
+          <a:prstGeom prst="rect">
+            <a:avLst/>
+          </a:prstGeom>
+          <a:ln w="76200" cmpd="sng">
+            <a:solidFill>
+              <a:schemeClr val="accent6">
+                <a:lumMod val="60000"/>
+                <a:lumOff val="40000"/>
+              </a:schemeClr>
+            </a:solidFill>
+          </a:ln>
+        </p:spPr>
+      </p:pic>
+      <p:pic>
+        <p:nvPicPr>
+          <p:cNvPr id="6" name="Picture 5" descr="Senza titolo 2.tiff"/>
+          <p:cNvPicPr>
+            <a:picLocks noChangeAspect="1"/>
+          </p:cNvPicPr>
+          <p:nvPr/>
+        </p:nvPicPr>
+        <p:blipFill>
+          <a:blip r:embed="rId3">
+            <a:extLst>
+              <a:ext uri="{28A0092B-C50C-407E-A947-70E740481C1C}">
+                <a14:useLocalDpi xmlns:a14="http://schemas.microsoft.com/office/drawing/2010/main" val="0"/>
+              </a:ext>
+            </a:extLst>
+          </a:blip>
+          <a:stretch>
+            <a:fillRect/>
+          </a:stretch>
+        </p:blipFill>
+        <p:spPr>
+          <a:xfrm>
+            <a:off x="539552" y="3861048"/>
+            <a:ext cx="3816424" cy="1804128"/>
+          </a:xfrm>
+          <a:prstGeom prst="rect">
+            <a:avLst/>
+          </a:prstGeom>
+          <a:ln w="76200" cmpd="sng">
+            <a:solidFill>
+              <a:srgbClr val="FF6600"/>
+            </a:solidFill>
+          </a:ln>
+        </p:spPr>
+      </p:pic>
+      <p:pic>
+        <p:nvPicPr>
+          <p:cNvPr id="7" name="Picture 6" descr="Senza titolo 3.tiff"/>
+          <p:cNvPicPr>
+            <a:picLocks noChangeAspect="1"/>
+          </p:cNvPicPr>
+          <p:nvPr/>
+        </p:nvPicPr>
+        <p:blipFill>
+          <a:blip r:embed="rId4">
+            <a:extLst>
+              <a:ext uri="{28A0092B-C50C-407E-A947-70E740481C1C}">
+                <a14:useLocalDpi xmlns:a14="http://schemas.microsoft.com/office/drawing/2010/main" val="0"/>
+              </a:ext>
+            </a:extLst>
+          </a:blip>
+          <a:stretch>
+            <a:fillRect/>
+          </a:stretch>
+        </p:blipFill>
+        <p:spPr>
+          <a:xfrm>
+            <a:off x="4788024" y="2060848"/>
+            <a:ext cx="3816424" cy="1812084"/>
+          </a:xfrm>
+          <a:prstGeom prst="rect">
+            <a:avLst/>
+          </a:prstGeom>
+          <a:ln w="76200" cmpd="sng">
+            <a:solidFill>
+              <a:srgbClr val="FFFF00"/>
+            </a:solidFill>
+          </a:ln>
+        </p:spPr>
+      </p:pic>
+      <p:sp>
+        <p:nvSpPr>
+          <p:cNvPr id="8" name="TextBox 7"/>
+          <p:cNvSpPr txBox="1"/>
+          <p:nvPr/>
+        </p:nvSpPr>
+        <p:spPr>
+          <a:xfrm>
+            <a:off x="4427984" y="1052736"/>
+            <a:ext cx="4176464" cy="707886"/>
+          </a:xfrm>
+          <a:prstGeom prst="rect">
+            <a:avLst/>
+          </a:prstGeom>
+          <a:solidFill>
+            <a:schemeClr val="accent6">
+              <a:lumMod val="60000"/>
+              <a:lumOff val="40000"/>
+            </a:schemeClr>
+          </a:solidFill>
+        </p:spPr>
+        <p:txBody>
+          <a:bodyPr wrap="square" rtlCol="0">
+            <a:spAutoFit/>
           </a:bodyPr>
           <a:lstStyle/>
           <a:p>
-            <a:r>
-              <a:rPr lang="it-IT" b="1" dirty="0" smtClean="0"/>
-              <a:t>Scelte stilistiche</a:t>
-            </a:r>
-            <a:endParaRPr lang="it-IT" b="1" dirty="0"/>
+            <a:pPr algn="ctr"/>
+            <a:r>
+              <a:rPr lang="en-US" sz="2000" b="1" dirty="0" err="1" smtClean="0">
+                <a:solidFill>
+                  <a:srgbClr val="000000"/>
+                </a:solidFill>
+              </a:rPr>
+              <a:t>Implementazione</a:t>
+            </a:r>
+            <a:r>
+              <a:rPr lang="en-US" sz="2000" b="1" dirty="0" smtClean="0">
+                <a:solidFill>
+                  <a:srgbClr val="000000"/>
+                </a:solidFill>
+              </a:rPr>
+              <a:t> </a:t>
+            </a:r>
+            <a:r>
+              <a:rPr lang="en-US" sz="2000" b="1" dirty="0" err="1" smtClean="0">
+                <a:solidFill>
+                  <a:srgbClr val="000000"/>
+                </a:solidFill>
+              </a:rPr>
+              <a:t>sequenza</a:t>
+            </a:r>
+            <a:r>
+              <a:rPr lang="en-US" sz="2000" b="1" dirty="0" smtClean="0">
+                <a:solidFill>
+                  <a:srgbClr val="000000"/>
+                </a:solidFill>
+              </a:rPr>
+              <a:t> di </a:t>
+            </a:r>
+            <a:r>
+              <a:rPr lang="en-US" sz="2000" b="1" dirty="0" err="1" smtClean="0">
+                <a:solidFill>
+                  <a:srgbClr val="000000"/>
+                </a:solidFill>
+              </a:rPr>
+              <a:t>fibonacci</a:t>
+            </a:r>
+            <a:r>
+              <a:rPr lang="en-US" sz="2000" b="1" dirty="0" smtClean="0">
+                <a:solidFill>
+                  <a:srgbClr val="000000"/>
+                </a:solidFill>
+              </a:rPr>
+              <a:t> </a:t>
+            </a:r>
+            <a:r>
+              <a:rPr lang="en-US" sz="2000" b="1" dirty="0" err="1" smtClean="0">
+                <a:solidFill>
+                  <a:srgbClr val="000000"/>
+                </a:solidFill>
+              </a:rPr>
+              <a:t>ricorsiva</a:t>
+            </a:r>
+            <a:endParaRPr lang="en-US" sz="2000" b="1" dirty="0">
+              <a:solidFill>
+                <a:srgbClr val="000000"/>
+              </a:solidFill>
+            </a:endParaRPr>
           </a:p>
         </p:txBody>
       </p:sp>
       <p:sp>
         <p:nvSpPr>
-          <p:cNvPr id="3" name="Segnaposto contenuto 2"/>
-          <p:cNvSpPr>
-            <a:spLocks noGrp="1"/>
-          </p:cNvSpPr>
-          <p:nvPr>
-            <p:ph idx="1"/>
-          </p:nvPr>
+          <p:cNvPr id="9" name="TextBox 8"/>
+          <p:cNvSpPr txBox="1"/>
+          <p:nvPr/>
         </p:nvSpPr>
         <p:spPr>
           <a:xfrm>
-            <a:off x="500034" y="1357298"/>
-            <a:ext cx="8229600" cy="4572000"/>
-          </a:xfrm>
+            <a:off x="539552" y="2852936"/>
+            <a:ext cx="4248472" cy="707886"/>
+          </a:xfrm>
+          <a:prstGeom prst="rect">
+            <a:avLst/>
+          </a:prstGeom>
+          <a:solidFill>
+            <a:srgbClr val="FFFF00"/>
+          </a:solidFill>
         </p:spPr>
         <p:txBody>
-          <a:bodyPr/>
+          <a:bodyPr wrap="square" rtlCol="0">
+            <a:spAutoFit/>
+          </a:bodyPr>
           <a:lstStyle/>
           <a:p>
-            <a:pPr>
-              <a:buNone/>
-            </a:pPr>
-            <a:r>
-              <a:rPr lang="it-IT" dirty="0" smtClean="0">
-                <a:solidFill>
-                  <a:schemeClr val="bg1"/>
-                </a:solidFill>
-              </a:rPr>
-              <a:t>I programmatori </a:t>
-            </a:r>
-            <a:r>
-              <a:rPr lang="it-IT" u="sng" dirty="0" smtClean="0">
-                <a:solidFill>
-                  <a:schemeClr val="bg1"/>
-                </a:solidFill>
-              </a:rPr>
-              <a:t>possono scegliere quale stile adottare</a:t>
-            </a:r>
-            <a:r>
-              <a:rPr lang="it-IT" dirty="0" smtClean="0">
-                <a:solidFill>
-                  <a:schemeClr val="bg1"/>
-                </a:solidFill>
-              </a:rPr>
-              <a:t> durante la stesura del codice.</a:t>
-            </a:r>
-          </a:p>
-          <a:p>
-            <a:pPr>
-              <a:buNone/>
-            </a:pPr>
-            <a:r>
-              <a:rPr lang="it-IT" dirty="0" smtClean="0">
-                <a:solidFill>
-                  <a:schemeClr val="bg1"/>
-                </a:solidFill>
-              </a:rPr>
-              <a:t>Un </a:t>
-            </a:r>
-            <a:r>
-              <a:rPr lang="it-IT" b="1" u="sng" dirty="0" smtClean="0">
-                <a:solidFill>
-                  <a:srgbClr val="FFC000"/>
-                </a:solidFill>
-              </a:rPr>
-              <a:t>codice leggibile</a:t>
-            </a:r>
-            <a:r>
-              <a:rPr lang="it-IT" dirty="0" smtClean="0">
-                <a:solidFill>
-                  <a:schemeClr val="bg1"/>
-                </a:solidFill>
-              </a:rPr>
-              <a:t>, il più delle volte, </a:t>
-            </a:r>
-            <a:r>
-              <a:rPr lang="it-IT" b="1" u="sng" dirty="0" smtClean="0">
-                <a:solidFill>
-                  <a:srgbClr val="FFC000"/>
-                </a:solidFill>
-              </a:rPr>
-              <a:t>risulta più lungo.</a:t>
-            </a:r>
-          </a:p>
-          <a:p>
-            <a:pPr>
-              <a:buNone/>
-            </a:pPr>
-            <a:r>
-              <a:rPr lang="it-IT" dirty="0" smtClean="0">
-                <a:solidFill>
-                  <a:schemeClr val="bg1"/>
-                </a:solidFill>
-              </a:rPr>
-              <a:t>Se vogliamo avere un </a:t>
-            </a:r>
-            <a:r>
-              <a:rPr lang="it-IT" b="1" u="sng" dirty="0" smtClean="0">
-                <a:solidFill>
-                  <a:srgbClr val="00B0F0"/>
+            <a:pPr algn="ctr"/>
+            <a:r>
+              <a:rPr lang="en-US" sz="2000" b="1" dirty="0" err="1" smtClean="0">
+                <a:solidFill>
+                  <a:srgbClr val="000000"/>
+                </a:solidFill>
+              </a:rPr>
+              <a:t>Stesso</a:t>
+            </a:r>
+            <a:r>
+              <a:rPr lang="en-US" sz="2000" b="1" dirty="0" smtClean="0">
+                <a:solidFill>
+                  <a:srgbClr val="000000"/>
+                </a:solidFill>
+              </a:rPr>
+              <a:t> </a:t>
+            </a:r>
+            <a:r>
+              <a:rPr lang="en-US" sz="2000" b="1" dirty="0" err="1" smtClean="0">
+                <a:solidFill>
+                  <a:srgbClr val="000000"/>
                 </a:solidFill>
               </a:rPr>
               <a:t>codice</a:t>
             </a:r>
             <a:r>
-              <a:rPr lang="it-IT" dirty="0" smtClean="0">
-                <a:solidFill>
-                  <a:schemeClr val="bg1"/>
-                </a:solidFill>
-              </a:rPr>
-              <a:t> più </a:t>
-            </a:r>
-            <a:r>
-              <a:rPr lang="it-IT" b="1" u="sng" dirty="0" smtClean="0">
-                <a:solidFill>
-                  <a:srgbClr val="00B0F0"/>
-                </a:solidFill>
-              </a:rPr>
-              <a:t>compatto</a:t>
-            </a:r>
-            <a:r>
-              <a:rPr lang="it-IT" dirty="0" smtClean="0">
-                <a:solidFill>
-                  <a:schemeClr val="bg1"/>
-                </a:solidFill>
-              </a:rPr>
-              <a:t> possiamo adottare sintassi specifiche </a:t>
-            </a:r>
-            <a:r>
-              <a:rPr lang="it-IT" b="1" u="sng" dirty="0" smtClean="0">
-                <a:solidFill>
-                  <a:srgbClr val="00B0F0"/>
-                </a:solidFill>
-              </a:rPr>
-              <a:t>a discapito della comprensibilità.</a:t>
-            </a:r>
-            <a:endParaRPr lang="it-IT" b="1" u="sng" dirty="0">
+              <a:rPr lang="en-US" sz="2000" b="1" dirty="0" smtClean="0">
+                <a:solidFill>
+                  <a:srgbClr val="000000"/>
+                </a:solidFill>
+              </a:rPr>
+              <a:t> </a:t>
+            </a:r>
+            <a:r>
+              <a:rPr lang="en-US" sz="2000" b="1" dirty="0" err="1" smtClean="0">
+                <a:solidFill>
+                  <a:srgbClr val="000000"/>
+                </a:solidFill>
+              </a:rPr>
+              <a:t>scelta</a:t>
+            </a:r>
+            <a:r>
+              <a:rPr lang="en-US" sz="2000" b="1" dirty="0" smtClean="0">
+                <a:solidFill>
+                  <a:srgbClr val="000000"/>
+                </a:solidFill>
+              </a:rPr>
+              <a:t> </a:t>
+            </a:r>
+            <a:r>
+              <a:rPr lang="en-US" sz="2000" b="1" dirty="0" err="1" smtClean="0">
+                <a:solidFill>
+                  <a:srgbClr val="000000"/>
+                </a:solidFill>
+              </a:rPr>
+              <a:t>stilistica</a:t>
+            </a:r>
+            <a:r>
+              <a:rPr lang="en-US" sz="2000" b="1" dirty="0" smtClean="0">
+                <a:solidFill>
+                  <a:srgbClr val="000000"/>
+                </a:solidFill>
+              </a:rPr>
+              <a:t> </a:t>
+            </a:r>
+            <a:r>
+              <a:rPr lang="en-US" sz="2000" b="1" dirty="0" err="1" smtClean="0">
+                <a:solidFill>
+                  <a:srgbClr val="000000"/>
+                </a:solidFill>
+              </a:rPr>
+              <a:t>diversa</a:t>
+            </a:r>
+            <a:endParaRPr lang="en-US" sz="2000" b="1" dirty="0">
               <a:solidFill>
-                <a:srgbClr val="00B0F0"/>
+                <a:srgbClr val="000000"/>
+              </a:solidFill>
+            </a:endParaRPr>
+          </a:p>
+        </p:txBody>
+      </p:sp>
+      <p:sp>
+        <p:nvSpPr>
+          <p:cNvPr id="10" name="TextBox 9"/>
+          <p:cNvSpPr txBox="1"/>
+          <p:nvPr/>
+        </p:nvSpPr>
+        <p:spPr>
+          <a:xfrm>
+            <a:off x="4355976" y="4221088"/>
+            <a:ext cx="4248472" cy="707886"/>
+          </a:xfrm>
+          <a:prstGeom prst="rect">
+            <a:avLst/>
+          </a:prstGeom>
+          <a:solidFill>
+            <a:srgbClr val="FF6600"/>
+          </a:solidFill>
+        </p:spPr>
+        <p:txBody>
+          <a:bodyPr wrap="square" rtlCol="0">
+            <a:spAutoFit/>
+          </a:bodyPr>
+          <a:lstStyle/>
+          <a:p>
+            <a:pPr algn="ctr"/>
+            <a:r>
+              <a:rPr lang="en-US" sz="2000" b="1" dirty="0" err="1" smtClean="0">
+                <a:solidFill>
+                  <a:srgbClr val="000000"/>
+                </a:solidFill>
+              </a:rPr>
+              <a:t>Implementazione</a:t>
+            </a:r>
+            <a:r>
+              <a:rPr lang="en-US" sz="2000" b="1" dirty="0" smtClean="0">
+                <a:solidFill>
+                  <a:srgbClr val="000000"/>
+                </a:solidFill>
+              </a:rPr>
+              <a:t> </a:t>
+            </a:r>
+            <a:r>
+              <a:rPr lang="en-US" sz="2000" b="1" dirty="0" err="1" smtClean="0">
+                <a:solidFill>
+                  <a:srgbClr val="000000"/>
+                </a:solidFill>
+              </a:rPr>
+              <a:t>sequenza</a:t>
+            </a:r>
+            <a:r>
+              <a:rPr lang="en-US" sz="2000" b="1" dirty="0" smtClean="0">
+                <a:solidFill>
+                  <a:srgbClr val="000000"/>
+                </a:solidFill>
+              </a:rPr>
+              <a:t> di </a:t>
+            </a:r>
+            <a:r>
+              <a:rPr lang="en-US" sz="2000" b="1" dirty="0" err="1" smtClean="0">
+                <a:solidFill>
+                  <a:srgbClr val="000000"/>
+                </a:solidFill>
+              </a:rPr>
+              <a:t>fibonacci</a:t>
+            </a:r>
+            <a:r>
+              <a:rPr lang="en-US" sz="2000" b="1" dirty="0" smtClean="0">
+                <a:solidFill>
+                  <a:srgbClr val="000000"/>
+                </a:solidFill>
+              </a:rPr>
+              <a:t> tail-recursive</a:t>
+            </a:r>
+            <a:endParaRPr lang="en-US" sz="2000" b="1" dirty="0">
+              <a:solidFill>
+                <a:srgbClr val="000000"/>
+              </a:solidFill>
+            </a:endParaRPr>
+          </a:p>
+        </p:txBody>
+      </p:sp>
+      <p:sp>
+        <p:nvSpPr>
+          <p:cNvPr id="11" name="TextBox 10"/>
+          <p:cNvSpPr txBox="1"/>
+          <p:nvPr/>
+        </p:nvSpPr>
+        <p:spPr>
+          <a:xfrm>
+            <a:off x="539552" y="5877272"/>
+            <a:ext cx="8064896" cy="830997"/>
+          </a:xfrm>
+          <a:prstGeom prst="rect">
+            <a:avLst/>
+          </a:prstGeom>
+          <a:noFill/>
+        </p:spPr>
+        <p:txBody>
+          <a:bodyPr wrap="square" rtlCol="0">
+            <a:spAutoFit/>
+          </a:bodyPr>
+          <a:lstStyle/>
+          <a:p>
+            <a:pPr algn="ctr"/>
+            <a:r>
+              <a:rPr lang="en-US" sz="2400" b="1" dirty="0" err="1" smtClean="0">
+                <a:solidFill>
+                  <a:srgbClr val="000000"/>
+                </a:solidFill>
+              </a:rPr>
+              <a:t>Diversi</a:t>
+            </a:r>
+            <a:r>
+              <a:rPr lang="en-US" sz="2400" b="1" dirty="0" smtClean="0">
+                <a:solidFill>
+                  <a:srgbClr val="000000"/>
+                </a:solidFill>
+              </a:rPr>
+              <a:t> </a:t>
+            </a:r>
+            <a:r>
+              <a:rPr lang="en-US" sz="2400" b="1" dirty="0" err="1" smtClean="0">
+                <a:solidFill>
+                  <a:srgbClr val="000000"/>
+                </a:solidFill>
+              </a:rPr>
+              <a:t>stili</a:t>
+            </a:r>
+            <a:r>
+              <a:rPr lang="en-US" sz="2400" b="1" dirty="0" smtClean="0">
+                <a:solidFill>
+                  <a:srgbClr val="000000"/>
+                </a:solidFill>
+              </a:rPr>
+              <a:t> di </a:t>
+            </a:r>
+            <a:r>
+              <a:rPr lang="en-US" sz="2400" b="1" dirty="0" err="1" smtClean="0">
+                <a:solidFill>
+                  <a:srgbClr val="000000"/>
+                </a:solidFill>
+              </a:rPr>
+              <a:t>implementazione</a:t>
+            </a:r>
+            <a:r>
+              <a:rPr lang="en-US" sz="2400" b="1" dirty="0" smtClean="0">
+                <a:solidFill>
+                  <a:srgbClr val="000000"/>
+                </a:solidFill>
+              </a:rPr>
+              <a:t> e </a:t>
+            </a:r>
+            <a:r>
+              <a:rPr lang="en-US" sz="2400" b="1" dirty="0" err="1" smtClean="0">
+                <a:solidFill>
+                  <a:srgbClr val="000000"/>
+                </a:solidFill>
+              </a:rPr>
+              <a:t>indentazione</a:t>
+            </a:r>
+            <a:r>
+              <a:rPr lang="en-US" sz="2400" b="1" dirty="0" smtClean="0">
+                <a:solidFill>
+                  <a:srgbClr val="000000"/>
+                </a:solidFill>
+              </a:rPr>
+              <a:t>, </a:t>
+            </a:r>
+            <a:r>
+              <a:rPr lang="en-US" sz="2400" b="1" dirty="0" err="1" smtClean="0">
+                <a:solidFill>
+                  <a:srgbClr val="000000"/>
+                </a:solidFill>
+              </a:rPr>
+              <a:t>lunghezza</a:t>
+            </a:r>
+            <a:r>
+              <a:rPr lang="en-US" sz="2400" b="1" dirty="0" smtClean="0">
+                <a:solidFill>
+                  <a:srgbClr val="000000"/>
+                </a:solidFill>
+              </a:rPr>
+              <a:t> </a:t>
+            </a:r>
+            <a:r>
+              <a:rPr lang="en-US" sz="2400" b="1" dirty="0" err="1" smtClean="0">
+                <a:solidFill>
+                  <a:srgbClr val="000000"/>
+                </a:solidFill>
+              </a:rPr>
+              <a:t>diversa</a:t>
+            </a:r>
+            <a:endParaRPr lang="en-US" sz="2400" b="1" dirty="0">
+              <a:solidFill>
+                <a:srgbClr val="000000"/>
               </a:solidFill>
             </a:endParaRPr>
           </a:p>
@@ -11754,9 +14054,575 @@
   <p:timing>
     <p:tnLst>
       <p:par>
-        <p:cTn id="1" dur="indefinite" restart="never" nodeType="tmRoot"/>
+        <p:cTn xmlns:p14="http://schemas.microsoft.com/office/powerpoint/2010/main" id="1" dur="indefinite" restart="never" nodeType="tmRoot">
+          <p:childTnLst>
+            <p:seq concurrent="1" nextAc="seek">
+              <p:cTn id="2" dur="indefinite" nodeType="mainSeq">
+                <p:childTnLst>
+                  <p:par>
+                    <p:cTn id="3" fill="hold">
+                      <p:stCondLst>
+                        <p:cond delay="indefinite"/>
+                      </p:stCondLst>
+                      <p:childTnLst>
+                        <p:par>
+                          <p:cTn id="4" fill="hold">
+                            <p:stCondLst>
+                              <p:cond delay="0"/>
+                            </p:stCondLst>
+                            <p:childTnLst>
+                              <p:par>
+                                <p:cTn id="5" presetID="2" presetClass="entr" presetSubtype="8" fill="hold" grpId="0" nodeType="clickEffect">
+                                  <p:stCondLst>
+                                    <p:cond delay="0"/>
+                                  </p:stCondLst>
+                                  <p:childTnLst>
+                                    <p:set>
+                                      <p:cBhvr>
+                                        <p:cTn id="6" dur="1" fill="hold">
+                                          <p:stCondLst>
+                                            <p:cond delay="0"/>
+                                          </p:stCondLst>
+                                        </p:cTn>
+                                        <p:tgtEl>
+                                          <p:spTgt spid="8"/>
+                                        </p:tgtEl>
+                                        <p:attrNameLst>
+                                          <p:attrName>style.visibility</p:attrName>
+                                        </p:attrNameLst>
+                                      </p:cBhvr>
+                                      <p:to>
+                                        <p:strVal val="visible"/>
+                                      </p:to>
+                                    </p:set>
+                                    <p:anim calcmode="lin" valueType="num">
+                                      <p:cBhvr additive="base">
+                                        <p:cTn id="7" dur="500" fill="hold"/>
+                                        <p:tgtEl>
+                                          <p:spTgt spid="8"/>
+                                        </p:tgtEl>
+                                        <p:attrNameLst>
+                                          <p:attrName>ppt_x</p:attrName>
+                                        </p:attrNameLst>
+                                      </p:cBhvr>
+                                      <p:tavLst>
+                                        <p:tav tm="0">
+                                          <p:val>
+                                            <p:strVal val="0-#ppt_w/2"/>
+                                          </p:val>
+                                        </p:tav>
+                                        <p:tav tm="100000">
+                                          <p:val>
+                                            <p:strVal val="#ppt_x"/>
+                                          </p:val>
+                                        </p:tav>
+                                      </p:tavLst>
+                                    </p:anim>
+                                    <p:anim calcmode="lin" valueType="num">
+                                      <p:cBhvr additive="base">
+                                        <p:cTn id="8" dur="500" fill="hold"/>
+                                        <p:tgtEl>
+                                          <p:spTgt spid="8"/>
+                                        </p:tgtEl>
+                                        <p:attrNameLst>
+                                          <p:attrName>ppt_y</p:attrName>
+                                        </p:attrNameLst>
+                                      </p:cBhvr>
+                                      <p:tavLst>
+                                        <p:tav tm="0">
+                                          <p:val>
+                                            <p:strVal val="#ppt_y"/>
+                                          </p:val>
+                                        </p:tav>
+                                        <p:tav tm="100000">
+                                          <p:val>
+                                            <p:strVal val="#ppt_y"/>
+                                          </p:val>
+                                        </p:tav>
+                                      </p:tavLst>
+                                    </p:anim>
+                                  </p:childTnLst>
+                                </p:cTn>
+                              </p:par>
+                              <p:par>
+                                <p:cTn id="9" presetID="2" presetClass="entr" presetSubtype="8" fill="hold" nodeType="withEffect">
+                                  <p:stCondLst>
+                                    <p:cond delay="0"/>
+                                  </p:stCondLst>
+                                  <p:childTnLst>
+                                    <p:set>
+                                      <p:cBhvr>
+                                        <p:cTn id="10" dur="1" fill="hold">
+                                          <p:stCondLst>
+                                            <p:cond delay="0"/>
+                                          </p:stCondLst>
+                                        </p:cTn>
+                                        <p:tgtEl>
+                                          <p:spTgt spid="5"/>
+                                        </p:tgtEl>
+                                        <p:attrNameLst>
+                                          <p:attrName>style.visibility</p:attrName>
+                                        </p:attrNameLst>
+                                      </p:cBhvr>
+                                      <p:to>
+                                        <p:strVal val="visible"/>
+                                      </p:to>
+                                    </p:set>
+                                    <p:anim calcmode="lin" valueType="num">
+                                      <p:cBhvr additive="base">
+                                        <p:cTn id="11" dur="500" fill="hold"/>
+                                        <p:tgtEl>
+                                          <p:spTgt spid="5"/>
+                                        </p:tgtEl>
+                                        <p:attrNameLst>
+                                          <p:attrName>ppt_x</p:attrName>
+                                        </p:attrNameLst>
+                                      </p:cBhvr>
+                                      <p:tavLst>
+                                        <p:tav tm="0">
+                                          <p:val>
+                                            <p:strVal val="0-#ppt_w/2"/>
+                                          </p:val>
+                                        </p:tav>
+                                        <p:tav tm="100000">
+                                          <p:val>
+                                            <p:strVal val="#ppt_x"/>
+                                          </p:val>
+                                        </p:tav>
+                                      </p:tavLst>
+                                    </p:anim>
+                                    <p:anim calcmode="lin" valueType="num">
+                                      <p:cBhvr additive="base">
+                                        <p:cTn id="12" dur="500" fill="hold"/>
+                                        <p:tgtEl>
+                                          <p:spTgt spid="5"/>
+                                        </p:tgtEl>
+                                        <p:attrNameLst>
+                                          <p:attrName>ppt_y</p:attrName>
+                                        </p:attrNameLst>
+                                      </p:cBhvr>
+                                      <p:tavLst>
+                                        <p:tav tm="0">
+                                          <p:val>
+                                            <p:strVal val="#ppt_y"/>
+                                          </p:val>
+                                        </p:tav>
+                                        <p:tav tm="100000">
+                                          <p:val>
+                                            <p:strVal val="#ppt_y"/>
+                                          </p:val>
+                                        </p:tav>
+                                      </p:tavLst>
+                                    </p:anim>
+                                  </p:childTnLst>
+                                </p:cTn>
+                              </p:par>
+                            </p:childTnLst>
+                          </p:cTn>
+                        </p:par>
+                      </p:childTnLst>
+                    </p:cTn>
+                  </p:par>
+                  <p:par>
+                    <p:cTn id="13" fill="hold">
+                      <p:stCondLst>
+                        <p:cond delay="indefinite"/>
+                      </p:stCondLst>
+                      <p:childTnLst>
+                        <p:par>
+                          <p:cTn id="14" fill="hold">
+                            <p:stCondLst>
+                              <p:cond delay="0"/>
+                            </p:stCondLst>
+                            <p:childTnLst>
+                              <p:par>
+                                <p:cTn id="15" presetID="2" presetClass="entr" presetSubtype="2" fill="hold" grpId="0" nodeType="clickEffect">
+                                  <p:stCondLst>
+                                    <p:cond delay="0"/>
+                                  </p:stCondLst>
+                                  <p:childTnLst>
+                                    <p:set>
+                                      <p:cBhvr>
+                                        <p:cTn id="16" dur="1" fill="hold">
+                                          <p:stCondLst>
+                                            <p:cond delay="0"/>
+                                          </p:stCondLst>
+                                        </p:cTn>
+                                        <p:tgtEl>
+                                          <p:spTgt spid="9"/>
+                                        </p:tgtEl>
+                                        <p:attrNameLst>
+                                          <p:attrName>style.visibility</p:attrName>
+                                        </p:attrNameLst>
+                                      </p:cBhvr>
+                                      <p:to>
+                                        <p:strVal val="visible"/>
+                                      </p:to>
+                                    </p:set>
+                                    <p:anim calcmode="lin" valueType="num">
+                                      <p:cBhvr additive="base">
+                                        <p:cTn id="17" dur="500" fill="hold"/>
+                                        <p:tgtEl>
+                                          <p:spTgt spid="9"/>
+                                        </p:tgtEl>
+                                        <p:attrNameLst>
+                                          <p:attrName>ppt_x</p:attrName>
+                                        </p:attrNameLst>
+                                      </p:cBhvr>
+                                      <p:tavLst>
+                                        <p:tav tm="0">
+                                          <p:val>
+                                            <p:strVal val="1+#ppt_w/2"/>
+                                          </p:val>
+                                        </p:tav>
+                                        <p:tav tm="100000">
+                                          <p:val>
+                                            <p:strVal val="#ppt_x"/>
+                                          </p:val>
+                                        </p:tav>
+                                      </p:tavLst>
+                                    </p:anim>
+                                    <p:anim calcmode="lin" valueType="num">
+                                      <p:cBhvr additive="base">
+                                        <p:cTn id="18" dur="500" fill="hold"/>
+                                        <p:tgtEl>
+                                          <p:spTgt spid="9"/>
+                                        </p:tgtEl>
+                                        <p:attrNameLst>
+                                          <p:attrName>ppt_y</p:attrName>
+                                        </p:attrNameLst>
+                                      </p:cBhvr>
+                                      <p:tavLst>
+                                        <p:tav tm="0">
+                                          <p:val>
+                                            <p:strVal val="#ppt_y"/>
+                                          </p:val>
+                                        </p:tav>
+                                        <p:tav tm="100000">
+                                          <p:val>
+                                            <p:strVal val="#ppt_y"/>
+                                          </p:val>
+                                        </p:tav>
+                                      </p:tavLst>
+                                    </p:anim>
+                                  </p:childTnLst>
+                                </p:cTn>
+                              </p:par>
+                              <p:par>
+                                <p:cTn id="19" presetID="2" presetClass="entr" presetSubtype="2" fill="hold" nodeType="withEffect">
+                                  <p:stCondLst>
+                                    <p:cond delay="0"/>
+                                  </p:stCondLst>
+                                  <p:childTnLst>
+                                    <p:set>
+                                      <p:cBhvr>
+                                        <p:cTn id="20" dur="1" fill="hold">
+                                          <p:stCondLst>
+                                            <p:cond delay="0"/>
+                                          </p:stCondLst>
+                                        </p:cTn>
+                                        <p:tgtEl>
+                                          <p:spTgt spid="7"/>
+                                        </p:tgtEl>
+                                        <p:attrNameLst>
+                                          <p:attrName>style.visibility</p:attrName>
+                                        </p:attrNameLst>
+                                      </p:cBhvr>
+                                      <p:to>
+                                        <p:strVal val="visible"/>
+                                      </p:to>
+                                    </p:set>
+                                    <p:anim calcmode="lin" valueType="num">
+                                      <p:cBhvr additive="base">
+                                        <p:cTn id="21" dur="500" fill="hold"/>
+                                        <p:tgtEl>
+                                          <p:spTgt spid="7"/>
+                                        </p:tgtEl>
+                                        <p:attrNameLst>
+                                          <p:attrName>ppt_x</p:attrName>
+                                        </p:attrNameLst>
+                                      </p:cBhvr>
+                                      <p:tavLst>
+                                        <p:tav tm="0">
+                                          <p:val>
+                                            <p:strVal val="1+#ppt_w/2"/>
+                                          </p:val>
+                                        </p:tav>
+                                        <p:tav tm="100000">
+                                          <p:val>
+                                            <p:strVal val="#ppt_x"/>
+                                          </p:val>
+                                        </p:tav>
+                                      </p:tavLst>
+                                    </p:anim>
+                                    <p:anim calcmode="lin" valueType="num">
+                                      <p:cBhvr additive="base">
+                                        <p:cTn id="22" dur="500" fill="hold"/>
+                                        <p:tgtEl>
+                                          <p:spTgt spid="7"/>
+                                        </p:tgtEl>
+                                        <p:attrNameLst>
+                                          <p:attrName>ppt_y</p:attrName>
+                                        </p:attrNameLst>
+                                      </p:cBhvr>
+                                      <p:tavLst>
+                                        <p:tav tm="0">
+                                          <p:val>
+                                            <p:strVal val="#ppt_y"/>
+                                          </p:val>
+                                        </p:tav>
+                                        <p:tav tm="100000">
+                                          <p:val>
+                                            <p:strVal val="#ppt_y"/>
+                                          </p:val>
+                                        </p:tav>
+                                      </p:tavLst>
+                                    </p:anim>
+                                  </p:childTnLst>
+                                </p:cTn>
+                              </p:par>
+                            </p:childTnLst>
+                          </p:cTn>
+                        </p:par>
+                      </p:childTnLst>
+                    </p:cTn>
+                  </p:par>
+                  <p:par>
+                    <p:cTn id="23" fill="hold">
+                      <p:stCondLst>
+                        <p:cond delay="indefinite"/>
+                      </p:stCondLst>
+                      <p:childTnLst>
+                        <p:par>
+                          <p:cTn id="24" fill="hold">
+                            <p:stCondLst>
+                              <p:cond delay="0"/>
+                            </p:stCondLst>
+                            <p:childTnLst>
+                              <p:par>
+                                <p:cTn id="25" presetID="2" presetClass="entr" presetSubtype="8" fill="hold" grpId="0" nodeType="clickEffect">
+                                  <p:stCondLst>
+                                    <p:cond delay="0"/>
+                                  </p:stCondLst>
+                                  <p:childTnLst>
+                                    <p:set>
+                                      <p:cBhvr>
+                                        <p:cTn id="26" dur="1" fill="hold">
+                                          <p:stCondLst>
+                                            <p:cond delay="0"/>
+                                          </p:stCondLst>
+                                        </p:cTn>
+                                        <p:tgtEl>
+                                          <p:spTgt spid="10"/>
+                                        </p:tgtEl>
+                                        <p:attrNameLst>
+                                          <p:attrName>style.visibility</p:attrName>
+                                        </p:attrNameLst>
+                                      </p:cBhvr>
+                                      <p:to>
+                                        <p:strVal val="visible"/>
+                                      </p:to>
+                                    </p:set>
+                                    <p:anim calcmode="lin" valueType="num">
+                                      <p:cBhvr additive="base">
+                                        <p:cTn id="27" dur="500" fill="hold"/>
+                                        <p:tgtEl>
+                                          <p:spTgt spid="10"/>
+                                        </p:tgtEl>
+                                        <p:attrNameLst>
+                                          <p:attrName>ppt_x</p:attrName>
+                                        </p:attrNameLst>
+                                      </p:cBhvr>
+                                      <p:tavLst>
+                                        <p:tav tm="0">
+                                          <p:val>
+                                            <p:strVal val="0-#ppt_w/2"/>
+                                          </p:val>
+                                        </p:tav>
+                                        <p:tav tm="100000">
+                                          <p:val>
+                                            <p:strVal val="#ppt_x"/>
+                                          </p:val>
+                                        </p:tav>
+                                      </p:tavLst>
+                                    </p:anim>
+                                    <p:anim calcmode="lin" valueType="num">
+                                      <p:cBhvr additive="base">
+                                        <p:cTn id="28" dur="500" fill="hold"/>
+                                        <p:tgtEl>
+                                          <p:spTgt spid="10"/>
+                                        </p:tgtEl>
+                                        <p:attrNameLst>
+                                          <p:attrName>ppt_y</p:attrName>
+                                        </p:attrNameLst>
+                                      </p:cBhvr>
+                                      <p:tavLst>
+                                        <p:tav tm="0">
+                                          <p:val>
+                                            <p:strVal val="#ppt_y"/>
+                                          </p:val>
+                                        </p:tav>
+                                        <p:tav tm="100000">
+                                          <p:val>
+                                            <p:strVal val="#ppt_y"/>
+                                          </p:val>
+                                        </p:tav>
+                                      </p:tavLst>
+                                    </p:anim>
+                                  </p:childTnLst>
+                                </p:cTn>
+                              </p:par>
+                              <p:par>
+                                <p:cTn id="29" presetID="2" presetClass="entr" presetSubtype="8" fill="hold" nodeType="withEffect">
+                                  <p:stCondLst>
+                                    <p:cond delay="0"/>
+                                  </p:stCondLst>
+                                  <p:childTnLst>
+                                    <p:set>
+                                      <p:cBhvr>
+                                        <p:cTn id="30" dur="1" fill="hold">
+                                          <p:stCondLst>
+                                            <p:cond delay="0"/>
+                                          </p:stCondLst>
+                                        </p:cTn>
+                                        <p:tgtEl>
+                                          <p:spTgt spid="6"/>
+                                        </p:tgtEl>
+                                        <p:attrNameLst>
+                                          <p:attrName>style.visibility</p:attrName>
+                                        </p:attrNameLst>
+                                      </p:cBhvr>
+                                      <p:to>
+                                        <p:strVal val="visible"/>
+                                      </p:to>
+                                    </p:set>
+                                    <p:anim calcmode="lin" valueType="num">
+                                      <p:cBhvr additive="base">
+                                        <p:cTn id="31" dur="500" fill="hold"/>
+                                        <p:tgtEl>
+                                          <p:spTgt spid="6"/>
+                                        </p:tgtEl>
+                                        <p:attrNameLst>
+                                          <p:attrName>ppt_x</p:attrName>
+                                        </p:attrNameLst>
+                                      </p:cBhvr>
+                                      <p:tavLst>
+                                        <p:tav tm="0">
+                                          <p:val>
+                                            <p:strVal val="0-#ppt_w/2"/>
+                                          </p:val>
+                                        </p:tav>
+                                        <p:tav tm="100000">
+                                          <p:val>
+                                            <p:strVal val="#ppt_x"/>
+                                          </p:val>
+                                        </p:tav>
+                                      </p:tavLst>
+                                    </p:anim>
+                                    <p:anim calcmode="lin" valueType="num">
+                                      <p:cBhvr additive="base">
+                                        <p:cTn id="32" dur="500" fill="hold"/>
+                                        <p:tgtEl>
+                                          <p:spTgt spid="6"/>
+                                        </p:tgtEl>
+                                        <p:attrNameLst>
+                                          <p:attrName>ppt_y</p:attrName>
+                                        </p:attrNameLst>
+                                      </p:cBhvr>
+                                      <p:tavLst>
+                                        <p:tav tm="0">
+                                          <p:val>
+                                            <p:strVal val="#ppt_y"/>
+                                          </p:val>
+                                        </p:tav>
+                                        <p:tav tm="100000">
+                                          <p:val>
+                                            <p:strVal val="#ppt_y"/>
+                                          </p:val>
+                                        </p:tav>
+                                      </p:tavLst>
+                                    </p:anim>
+                                  </p:childTnLst>
+                                </p:cTn>
+                              </p:par>
+                            </p:childTnLst>
+                          </p:cTn>
+                        </p:par>
+                      </p:childTnLst>
+                    </p:cTn>
+                  </p:par>
+                  <p:par>
+                    <p:cTn id="33" fill="hold">
+                      <p:stCondLst>
+                        <p:cond delay="indefinite"/>
+                      </p:stCondLst>
+                      <p:childTnLst>
+                        <p:par>
+                          <p:cTn id="34" fill="hold">
+                            <p:stCondLst>
+                              <p:cond delay="0"/>
+                            </p:stCondLst>
+                            <p:childTnLst>
+                              <p:par>
+                                <p:cTn id="35" presetID="1" presetClass="entr" presetSubtype="0" fill="hold" grpId="0" nodeType="clickEffect">
+                                  <p:stCondLst>
+                                    <p:cond delay="0"/>
+                                  </p:stCondLst>
+                                  <p:childTnLst>
+                                    <p:set>
+                                      <p:cBhvr>
+                                        <p:cTn id="36" dur="1" fill="hold">
+                                          <p:stCondLst>
+                                            <p:cond delay="0"/>
+                                          </p:stCondLst>
+                                        </p:cTn>
+                                        <p:tgtEl>
+                                          <p:spTgt spid="11"/>
+                                        </p:tgtEl>
+                                        <p:attrNameLst>
+                                          <p:attrName>style.visibility</p:attrName>
+                                        </p:attrNameLst>
+                                      </p:cBhvr>
+                                      <p:to>
+                                        <p:strVal val="visible"/>
+                                      </p:to>
+                                    </p:set>
+                                  </p:childTnLst>
+                                </p:cTn>
+                              </p:par>
+                            </p:childTnLst>
+                          </p:cTn>
+                        </p:par>
+                      </p:childTnLst>
+                    </p:cTn>
+                  </p:par>
+                </p:childTnLst>
+              </p:cTn>
+              <p:prevCondLst>
+                <p:cond evt="onPrev" delay="0">
+                  <p:tgtEl>
+                    <p:sldTgt/>
+                  </p:tgtEl>
+                </p:cond>
+              </p:prevCondLst>
+              <p:nextCondLst>
+                <p:cond evt="onNext" delay="0">
+                  <p:tgtEl>
+                    <p:sldTgt/>
+                  </p:tgtEl>
+                </p:cond>
+              </p:nextCondLst>
+            </p:seq>
+          </p:childTnLst>
+        </p:cTn>
       </p:par>
     </p:tnLst>
+    <p:bldLst>
+      <p:bldP spid="8" grpId="0" animBg="1"/>
+      <p:bldP spid="9" grpId="0" animBg="1"/>
+      <p:bldP spid="10" grpId="0" animBg="1"/>
+      <p:bldP spid="11" grpId="0"/>
+    </p:bldLst>
   </p:timing>
 </p:sld>
 </file>
@@ -11791,103 +14657,340 @@
         <p:spPr>
           <a:xfrm>
             <a:off x="0" y="0"/>
-            <a:ext cx="8229600" cy="875490"/>
+            <a:ext cx="8229600" cy="732614"/>
           </a:xfrm>
         </p:spPr>
         <p:txBody>
-          <a:bodyPr/>
+          <a:bodyPr>
+            <a:normAutofit/>
+          </a:bodyPr>
           <a:lstStyle/>
           <a:p>
             <a:r>
-              <a:rPr lang="it-IT" dirty="0" smtClean="0"/>
-              <a:t>Esempio (Linguaggio C)</a:t>
-            </a:r>
-            <a:endParaRPr lang="it-IT" dirty="0"/>
+              <a:rPr lang="it-IT" b="1" dirty="0" smtClean="0"/>
+              <a:t>Conclusioni</a:t>
+            </a:r>
+            <a:endParaRPr lang="it-IT" b="1" dirty="0"/>
           </a:p>
         </p:txBody>
       </p:sp>
       <p:sp>
         <p:nvSpPr>
-          <p:cNvPr id="3" name="Segnaposto contenuto 2"/>
-          <p:cNvSpPr>
-            <a:spLocks noGrp="1"/>
+          <p:cNvPr id="4" name="Segnaposto contenuto 2"/>
+          <p:cNvSpPr txBox="1">
+            <a:spLocks/>
           </p:cNvSpPr>
-          <p:nvPr>
-            <p:ph idx="1"/>
-          </p:nvPr>
+          <p:nvPr/>
         </p:nvSpPr>
-        <p:spPr/>
+        <p:spPr>
+          <a:xfrm>
+            <a:off x="0" y="980728"/>
+            <a:ext cx="9144000" cy="1117564"/>
+          </a:xfrm>
+          <a:prstGeom prst="rect">
+            <a:avLst/>
+          </a:prstGeom>
+        </p:spPr>
         <p:txBody>
-          <a:bodyPr/>
-          <a:lstStyle/>
+          <a:bodyPr vert="horz" anchor="t">
+            <a:normAutofit fontScale="85000" lnSpcReduction="10000"/>
+          </a:bodyPr>
+          <a:lstStyle>
+            <a:lvl1pPr marL="448056" indent="-384048" algn="l" rtl="0" eaLnBrk="1" latinLnBrk="0" hangingPunct="1">
+              <a:spcBef>
+                <a:spcPct val="20000"/>
+              </a:spcBef>
+              <a:buClr>
+                <a:schemeClr val="accent1"/>
+              </a:buClr>
+              <a:buSzPct val="80000"/>
+              <a:buFont typeface="Wingdings 2"/>
+              <a:buChar char=""/>
+              <a:defRPr kumimoji="0" sz="3000" kern="1200">
+                <a:solidFill>
+                  <a:schemeClr val="tx1"/>
+                </a:solidFill>
+                <a:latin typeface="+mn-lt"/>
+                <a:ea typeface="+mn-ea"/>
+                <a:cs typeface="+mn-cs"/>
+              </a:defRPr>
+            </a:lvl1pPr>
+            <a:lvl2pPr marL="822960" indent="-285750" algn="l" rtl="0" eaLnBrk="1" latinLnBrk="0" hangingPunct="1">
+              <a:spcBef>
+                <a:spcPct val="20000"/>
+              </a:spcBef>
+              <a:buClr>
+                <a:schemeClr val="accent1"/>
+              </a:buClr>
+              <a:buSzPct val="95000"/>
+              <a:buFont typeface="Verdana"/>
+              <a:buChar char="›"/>
+              <a:defRPr kumimoji="0" sz="2600" kern="1200">
+                <a:solidFill>
+                  <a:schemeClr val="tx1"/>
+                </a:solidFill>
+                <a:latin typeface="+mn-lt"/>
+                <a:ea typeface="+mn-ea"/>
+                <a:cs typeface="+mn-cs"/>
+              </a:defRPr>
+            </a:lvl2pPr>
+            <a:lvl3pPr marL="1106424" indent="-228600" algn="l" rtl="0" eaLnBrk="1" latinLnBrk="0" hangingPunct="1">
+              <a:spcBef>
+                <a:spcPct val="20000"/>
+              </a:spcBef>
+              <a:buClr>
+                <a:schemeClr val="accent1"/>
+              </a:buClr>
+              <a:buFont typeface="Wingdings 2"/>
+              <a:buChar char=""/>
+              <a:defRPr kumimoji="0" sz="2400" kern="1200">
+                <a:solidFill>
+                  <a:schemeClr val="tx1"/>
+                </a:solidFill>
+                <a:latin typeface="+mn-lt"/>
+                <a:ea typeface="+mn-ea"/>
+                <a:cs typeface="+mn-cs"/>
+              </a:defRPr>
+            </a:lvl3pPr>
+            <a:lvl4pPr marL="1371600" indent="-210312" algn="l" rtl="0" eaLnBrk="1" latinLnBrk="0" hangingPunct="1">
+              <a:spcBef>
+                <a:spcPct val="20000"/>
+              </a:spcBef>
+              <a:buClr>
+                <a:schemeClr val="accent1"/>
+              </a:buClr>
+              <a:buFont typeface="Wingdings 2"/>
+              <a:buChar char=""/>
+              <a:defRPr kumimoji="0" sz="2000" kern="1200">
+                <a:solidFill>
+                  <a:schemeClr val="tx1"/>
+                </a:solidFill>
+                <a:latin typeface="+mn-lt"/>
+                <a:ea typeface="+mn-ea"/>
+                <a:cs typeface="+mn-cs"/>
+              </a:defRPr>
+            </a:lvl4pPr>
+            <a:lvl5pPr marL="1600200" indent="-210312" algn="l" rtl="0" eaLnBrk="1" latinLnBrk="0" hangingPunct="1">
+              <a:spcBef>
+                <a:spcPct val="20000"/>
+              </a:spcBef>
+              <a:buClr>
+                <a:schemeClr val="accent1">
+                  <a:tint val="75000"/>
+                </a:schemeClr>
+              </a:buClr>
+              <a:buFont typeface="Wingdings 2"/>
+              <a:buChar char=""/>
+              <a:defRPr kumimoji="0" sz="1900" kern="1200">
+                <a:solidFill>
+                  <a:schemeClr val="tx1"/>
+                </a:solidFill>
+                <a:latin typeface="+mn-lt"/>
+                <a:ea typeface="+mn-ea"/>
+                <a:cs typeface="+mn-cs"/>
+              </a:defRPr>
+            </a:lvl5pPr>
+            <a:lvl6pPr marL="1828800" indent="-210312" algn="l" rtl="0" eaLnBrk="1" latinLnBrk="0" hangingPunct="1">
+              <a:spcBef>
+                <a:spcPct val="20000"/>
+              </a:spcBef>
+              <a:buClr>
+                <a:schemeClr val="accent1">
+                  <a:tint val="75000"/>
+                </a:schemeClr>
+              </a:buClr>
+              <a:buFont typeface="Wingdings 2"/>
+              <a:buChar char=""/>
+              <a:defRPr kumimoji="0" sz="1800" kern="1200">
+                <a:solidFill>
+                  <a:schemeClr val="tx1"/>
+                </a:solidFill>
+                <a:latin typeface="+mn-lt"/>
+                <a:ea typeface="+mn-ea"/>
+                <a:cs typeface="+mn-cs"/>
+              </a:defRPr>
+            </a:lvl6pPr>
+            <a:lvl7pPr marL="2084832" indent="-210312" algn="l" rtl="0" eaLnBrk="1" latinLnBrk="0" hangingPunct="1">
+              <a:spcBef>
+                <a:spcPct val="20000"/>
+              </a:spcBef>
+              <a:buClr>
+                <a:schemeClr val="accent1">
+                  <a:tint val="75000"/>
+                </a:schemeClr>
+              </a:buClr>
+              <a:buFont typeface="Wingdings 2"/>
+              <a:buChar char=""/>
+              <a:defRPr kumimoji="0" sz="1600" kern="1200">
+                <a:solidFill>
+                  <a:schemeClr val="tx1"/>
+                </a:solidFill>
+                <a:latin typeface="+mn-lt"/>
+                <a:ea typeface="+mn-ea"/>
+                <a:cs typeface="+mn-cs"/>
+              </a:defRPr>
+            </a:lvl7pPr>
+            <a:lvl8pPr marL="2286000" indent="-182880" algn="l" rtl="0" eaLnBrk="1" latinLnBrk="0" hangingPunct="1">
+              <a:spcBef>
+                <a:spcPct val="20000"/>
+              </a:spcBef>
+              <a:buClr>
+                <a:schemeClr val="accent1">
+                  <a:tint val="75000"/>
+                </a:schemeClr>
+              </a:buClr>
+              <a:buFont typeface="Wingdings 2"/>
+              <a:buChar char=""/>
+              <a:defRPr kumimoji="0" sz="1600" kern="1200">
+                <a:solidFill>
+                  <a:schemeClr val="tx1"/>
+                </a:solidFill>
+                <a:latin typeface="+mn-lt"/>
+                <a:ea typeface="+mn-ea"/>
+                <a:cs typeface="+mn-cs"/>
+              </a:defRPr>
+            </a:lvl8pPr>
+            <a:lvl9pPr marL="2514600" indent="-182880" algn="l" rtl="0" eaLnBrk="1" latinLnBrk="0" hangingPunct="1">
+              <a:spcBef>
+                <a:spcPct val="20000"/>
+              </a:spcBef>
+              <a:buClr>
+                <a:schemeClr val="accent1">
+                  <a:tint val="75000"/>
+                </a:schemeClr>
+              </a:buClr>
+              <a:buFont typeface="Wingdings 2"/>
+              <a:buChar char=""/>
+              <a:defRPr kumimoji="0" sz="1600" kern="1200">
+                <a:solidFill>
+                  <a:schemeClr val="tx1"/>
+                </a:solidFill>
+                <a:latin typeface="+mn-lt"/>
+                <a:ea typeface="+mn-ea"/>
+                <a:cs typeface="+mn-cs"/>
+              </a:defRPr>
+            </a:lvl9pPr>
+          </a:lstStyle>
           <a:p>
             <a:pPr>
+              <a:buFont typeface="Wingdings 2"/>
               <a:buNone/>
             </a:pPr>
             <a:r>
-              <a:rPr lang="it-IT" dirty="0" smtClean="0"/>
-              <a:t>Fare esempio con codici uguali.</a:t>
-            </a:r>
-          </a:p>
-          <a:p>
-            <a:pPr>
-              <a:buNone/>
-            </a:pPr>
-            <a:r>
-              <a:rPr lang="it-IT" dirty="0" smtClean="0"/>
-              <a:t>Uno tutto su una linea con il nome delle variabili completo (</a:t>
-            </a:r>
-            <a:r>
-              <a:rPr lang="it-IT" dirty="0" err="1" smtClean="0"/>
-              <a:t>es</a:t>
-            </a:r>
-            <a:r>
-              <a:rPr lang="it-IT" dirty="0" smtClean="0"/>
-              <a:t>: variabile e non </a:t>
-            </a:r>
-            <a:r>
-              <a:rPr lang="it-IT" dirty="0" err="1" smtClean="0"/>
-              <a:t>var</a:t>
-            </a:r>
-            <a:r>
-              <a:rPr lang="it-IT" dirty="0" smtClean="0"/>
-              <a:t>)</a:t>
-            </a:r>
-          </a:p>
-          <a:p>
-            <a:pPr>
-              <a:buNone/>
-            </a:pPr>
-            <a:r>
-              <a:rPr lang="it-IT" dirty="0" smtClean="0"/>
-              <a:t>Uno su più linee con variabili complete</a:t>
-            </a:r>
-          </a:p>
-          <a:p>
-            <a:pPr>
-              <a:buNone/>
-            </a:pPr>
-            <a:r>
-              <a:rPr lang="it-IT" dirty="0" smtClean="0"/>
-              <a:t>Uno su una linea con variabili abbreviate</a:t>
-            </a:r>
-          </a:p>
-          <a:p>
-            <a:pPr>
-              <a:buNone/>
-            </a:pPr>
-            <a:r>
-              <a:rPr lang="it-IT" dirty="0" smtClean="0"/>
-              <a:t>Uno su più linee con variabili abbreviate </a:t>
-            </a:r>
+              <a:rPr lang="it-IT" sz="3200" dirty="0" smtClean="0"/>
+              <a:t>Ma allora, il numero di righe di codice rappresenta una </a:t>
+            </a:r>
+            <a:r>
+              <a:rPr lang="it-IT" sz="3200" b="1" dirty="0" smtClean="0">
+                <a:solidFill>
+                  <a:srgbClr val="FFFF00"/>
+                </a:solidFill>
+              </a:rPr>
+              <a:t>metrica di qualità </a:t>
+            </a:r>
+            <a:r>
+              <a:rPr lang="it-IT" sz="3200" dirty="0" smtClean="0"/>
+              <a:t>di un software? </a:t>
+            </a:r>
+            <a:endParaRPr lang="it-IT" sz="3200" dirty="0"/>
           </a:p>
         </p:txBody>
       </p:sp>
+      <p:sp>
+        <p:nvSpPr>
+          <p:cNvPr id="5" name="TextBox 4"/>
+          <p:cNvSpPr txBox="1"/>
+          <p:nvPr/>
+        </p:nvSpPr>
+        <p:spPr>
+          <a:xfrm>
+            <a:off x="467544" y="2420888"/>
+            <a:ext cx="4104456" cy="3816429"/>
+          </a:xfrm>
+          <a:prstGeom prst="rect">
+            <a:avLst/>
+          </a:prstGeom>
+          <a:noFill/>
+        </p:spPr>
+        <p:txBody>
+          <a:bodyPr wrap="square" rtlCol="0">
+            <a:spAutoFit/>
+          </a:bodyPr>
+          <a:lstStyle/>
+          <a:p>
+            <a:pPr algn="ctr"/>
+            <a:r>
+              <a:rPr lang="it-IT" sz="3200" dirty="0"/>
+              <a:t>Come osservato, il numero di linee di codice </a:t>
+            </a:r>
+            <a:r>
+              <a:rPr lang="it-IT" sz="3200" b="1" u="sng" dirty="0">
+                <a:solidFill>
+                  <a:srgbClr val="FFFF00"/>
+                </a:solidFill>
+              </a:rPr>
+              <a:t>non può essere considerato </a:t>
+            </a:r>
+            <a:r>
+              <a:rPr lang="it-IT" sz="3200" dirty="0"/>
+              <a:t>una </a:t>
+            </a:r>
+            <a:r>
+              <a:rPr lang="it-IT" sz="3200" dirty="0" smtClean="0"/>
+              <a:t>metrica </a:t>
+            </a:r>
+            <a:r>
+              <a:rPr lang="it-IT" sz="3200" dirty="0"/>
+              <a:t>di qualità di un prodotto software.</a:t>
+            </a:r>
+          </a:p>
+          <a:p>
+            <a:endParaRPr lang="en-US" dirty="0"/>
+          </a:p>
+        </p:txBody>
+      </p:sp>
+      <p:pic>
+        <p:nvPicPr>
+          <p:cNvPr id="6" name="Picture 5" descr="Grumpy-Cat-NO-300x300.jpg"/>
+          <p:cNvPicPr>
+            <a:picLocks noChangeAspect="1"/>
+          </p:cNvPicPr>
+          <p:nvPr/>
+        </p:nvPicPr>
+        <p:blipFill>
+          <a:blip r:embed="rId2">
+            <a:extLst>
+              <a:ext uri="{28A0092B-C50C-407E-A947-70E740481C1C}">
+                <a14:useLocalDpi xmlns:a14="http://schemas.microsoft.com/office/drawing/2010/main" val="0"/>
+              </a:ext>
+            </a:extLst>
+          </a:blip>
+          <a:stretch>
+            <a:fillRect/>
+          </a:stretch>
+        </p:blipFill>
+        <p:spPr>
+          <a:xfrm>
+            <a:off x="4932040" y="2204864"/>
+            <a:ext cx="3528392" cy="4248472"/>
+          </a:xfrm>
+          <a:prstGeom prst="rect">
+            <a:avLst/>
+          </a:prstGeom>
+        </p:spPr>
+      </p:pic>
     </p:spTree>
   </p:cSld>
   <p:clrMapOvr>
     <a:masterClrMapping/>
   </p:clrMapOvr>
+  <p:timing>
+    <p:tnLst>
+      <p:par>
+        <p:cTn xmlns:p14="http://schemas.microsoft.com/office/powerpoint/2010/main" id="1" dur="indefinite" restart="never" nodeType="tmRoot"/>
+      </p:par>
+    </p:tnLst>
+  </p:timing>
 </p:sld>
 </file>
 
@@ -11918,92 +15021,6 @@
             <p:ph type="title"/>
           </p:nvPr>
         </p:nvSpPr>
-        <p:spPr>
-          <a:xfrm>
-            <a:off x="0" y="0"/>
-            <a:ext cx="8229600" cy="732614"/>
-          </a:xfrm>
-        </p:spPr>
-        <p:txBody>
-          <a:bodyPr>
-            <a:normAutofit/>
-          </a:bodyPr>
-          <a:lstStyle/>
-          <a:p>
-            <a:r>
-              <a:rPr lang="it-IT" b="1" dirty="0" smtClean="0"/>
-              <a:t>Conclusioni</a:t>
-            </a:r>
-            <a:endParaRPr lang="it-IT" b="1" dirty="0"/>
-          </a:p>
-        </p:txBody>
-      </p:sp>
-      <p:sp>
-        <p:nvSpPr>
-          <p:cNvPr id="3" name="Segnaposto contenuto 2"/>
-          <p:cNvSpPr>
-            <a:spLocks noGrp="1"/>
-          </p:cNvSpPr>
-          <p:nvPr>
-            <p:ph idx="1"/>
-          </p:nvPr>
-        </p:nvSpPr>
-        <p:spPr>
-          <a:xfrm>
-            <a:off x="500034" y="1071546"/>
-            <a:ext cx="8229600" cy="4572000"/>
-          </a:xfrm>
-        </p:spPr>
-        <p:txBody>
-          <a:bodyPr/>
-          <a:lstStyle/>
-          <a:p>
-            <a:pPr>
-              <a:buNone/>
-            </a:pPr>
-            <a:r>
-              <a:rPr lang="it-IT" dirty="0" smtClean="0"/>
-              <a:t>Conclusioni</a:t>
-            </a:r>
-            <a:endParaRPr lang="it-IT" dirty="0"/>
-          </a:p>
-        </p:txBody>
-      </p:sp>
-    </p:spTree>
-  </p:cSld>
-  <p:clrMapOvr>
-    <a:masterClrMapping/>
-  </p:clrMapOvr>
-</p:sld>
-</file>
-
-<file path=ppt/slides/slide28.xml><?xml version="1.0" encoding="utf-8"?>
-<p:sld xmlns:a="http://schemas.openxmlformats.org/drawingml/2006/main" xmlns:r="http://schemas.openxmlformats.org/officeDocument/2006/relationships" xmlns:p="http://schemas.openxmlformats.org/presentationml/2006/main">
-  <p:cSld>
-    <p:spTree>
-      <p:nvGrpSpPr>
-        <p:cNvPr id="1" name=""/>
-        <p:cNvGrpSpPr/>
-        <p:nvPr/>
-      </p:nvGrpSpPr>
-      <p:grpSpPr>
-        <a:xfrm>
-          <a:off x="0" y="0"/>
-          <a:ext cx="0" cy="0"/>
-          <a:chOff x="0" y="0"/>
-          <a:chExt cx="0" cy="0"/>
-        </a:xfrm>
-      </p:grpSpPr>
-      <p:sp>
-        <p:nvSpPr>
-          <p:cNvPr id="2" name="Titolo 1"/>
-          <p:cNvSpPr>
-            <a:spLocks noGrp="1"/>
-          </p:cNvSpPr>
-          <p:nvPr>
-            <p:ph type="title"/>
-          </p:nvPr>
-        </p:nvSpPr>
         <p:spPr/>
         <p:txBody>
           <a:bodyPr/>
@@ -12041,6 +15058,13 @@
   <p:clrMapOvr>
     <a:masterClrMapping/>
   </p:clrMapOvr>
+  <p:timing>
+    <p:tnLst>
+      <p:par>
+        <p:cTn xmlns:p14="http://schemas.microsoft.com/office/powerpoint/2010/main" id="1" dur="indefinite" restart="never" nodeType="tmRoot"/>
+      </p:par>
+    </p:tnLst>
+  </p:timing>
 </p:sld>
 </file>
 
@@ -12252,7 +15276,7 @@
   <p:timing>
     <p:tnLst>
       <p:par>
-        <p:cTn id="1" dur="indefinite" restart="never" nodeType="tmRoot"/>
+        <p:cTn xmlns:p14="http://schemas.microsoft.com/office/powerpoint/2010/main" id="1" dur="indefinite" restart="never" nodeType="tmRoot"/>
       </p:par>
     </p:tnLst>
   </p:timing>
@@ -12438,7 +15462,7 @@
   <p:timing>
     <p:tnLst>
       <p:par>
-        <p:cTn id="1" dur="indefinite" restart="never" nodeType="tmRoot">
+        <p:cTn xmlns:p14="http://schemas.microsoft.com/office/powerpoint/2010/main" id="1" dur="indefinite" restart="never" nodeType="tmRoot">
           <p:childTnLst>
             <p:seq concurrent="1" nextAc="seek">
               <p:cTn id="2" dur="indefinite" nodeType="mainSeq">
@@ -12998,7 +16022,7 @@
   <p:timing>
     <p:tnLst>
       <p:par>
-        <p:cTn id="1" dur="indefinite" restart="never" nodeType="tmRoot">
+        <p:cTn xmlns:p14="http://schemas.microsoft.com/office/powerpoint/2010/main" id="1" dur="indefinite" restart="never" nodeType="tmRoot">
           <p:childTnLst>
             <p:seq concurrent="1" nextAc="seek">
               <p:cTn id="2" dur="indefinite" nodeType="mainSeq">
@@ -13466,7 +16490,7 @@
   <p:timing>
     <p:tnLst>
       <p:par>
-        <p:cTn id="1" dur="indefinite" restart="never" nodeType="tmRoot"/>
+        <p:cTn xmlns:p14="http://schemas.microsoft.com/office/powerpoint/2010/main" id="1" dur="indefinite" restart="never" nodeType="tmRoot"/>
       </p:par>
     </p:tnLst>
   </p:timing>
@@ -13904,7 +16928,7 @@
   <p:timing>
     <p:tnLst>
       <p:par>
-        <p:cTn id="1" dur="indefinite" restart="never" nodeType="tmRoot">
+        <p:cTn xmlns:p14="http://schemas.microsoft.com/office/powerpoint/2010/main" id="1" dur="indefinite" restart="never" nodeType="tmRoot">
           <p:childTnLst>
             <p:seq concurrent="1" nextAc="seek">
               <p:cTn id="2" dur="indefinite" nodeType="mainSeq">
@@ -14531,7 +17555,7 @@
   <p:timing>
     <p:tnLst>
       <p:par>
-        <p:cTn id="1" dur="indefinite" restart="never" nodeType="tmRoot">
+        <p:cTn xmlns:p14="http://schemas.microsoft.com/office/powerpoint/2010/main" id="1" dur="indefinite" restart="never" nodeType="tmRoot">
           <p:childTnLst>
             <p:seq concurrent="1" nextAc="seek">
               <p:cTn id="2" dur="indefinite" nodeType="mainSeq">
@@ -15029,7 +18053,7 @@
   <p:timing>
     <p:tnLst>
       <p:par>
-        <p:cTn id="1" dur="indefinite" restart="never" nodeType="tmRoot">
+        <p:cTn xmlns:p14="http://schemas.microsoft.com/office/powerpoint/2010/main" id="1" dur="indefinite" restart="never" nodeType="tmRoot">
           <p:childTnLst>
             <p:seq concurrent="1" nextAc="seek">
               <p:cTn id="2" dur="indefinite" nodeType="mainSeq">

</xml_diff>

<commit_message>
Fine quesito 5 team
</commit_message>
<xml_diff>
--- a/Quesito 5 Team/Metrica – Linee di codice.pptx
+++ b/Quesito 5 Team/Metrica – Linee di codice.pptx
@@ -3653,7 +3653,7 @@
             <a:fld id="{0106B4A3-4212-4E39-93DE-E053E8F69C28}" type="datetimeFigureOut">
               <a:rPr lang="en-US" smtClean="0"/>
               <a:pPr/>
-              <a:t>05/05/16</a:t>
+              <a:t>08/05/16</a:t>
             </a:fld>
             <a:endParaRPr lang="en-US"/>
           </a:p>
@@ -3842,7 +3842,7 @@
             <a:fld id="{0106B4A3-4212-4E39-93DE-E053E8F69C28}" type="datetimeFigureOut">
               <a:rPr lang="en-US" smtClean="0"/>
               <a:pPr/>
-              <a:t>05/05/16</a:t>
+              <a:t>08/05/16</a:t>
             </a:fld>
             <a:endParaRPr lang="en-US"/>
           </a:p>
@@ -4019,7 +4019,7 @@
             <a:fld id="{0106B4A3-4212-4E39-93DE-E053E8F69C28}" type="datetimeFigureOut">
               <a:rPr lang="en-US" smtClean="0"/>
               <a:pPr/>
-              <a:t>05/05/16</a:t>
+              <a:t>08/05/16</a:t>
             </a:fld>
             <a:endParaRPr lang="en-US"/>
           </a:p>
@@ -4201,7 +4201,7 @@
             <a:fld id="{0106B4A3-4212-4E39-93DE-E053E8F69C28}" type="datetimeFigureOut">
               <a:rPr lang="en-US" smtClean="0"/>
               <a:pPr/>
-              <a:t>05/05/16</a:t>
+              <a:t>08/05/16</a:t>
             </a:fld>
             <a:endParaRPr lang="en-US"/>
           </a:p>
@@ -4450,7 +4450,7 @@
             <a:fld id="{0106B4A3-4212-4E39-93DE-E053E8F69C28}" type="datetimeFigureOut">
               <a:rPr lang="en-US" smtClean="0"/>
               <a:pPr/>
-              <a:t>05/05/16</a:t>
+              <a:t>08/05/16</a:t>
             </a:fld>
             <a:endParaRPr lang="en-US"/>
           </a:p>
@@ -4926,7 +4926,7 @@
             <a:fld id="{0106B4A3-4212-4E39-93DE-E053E8F69C28}" type="datetimeFigureOut">
               <a:rPr lang="en-US" smtClean="0"/>
               <a:pPr/>
-              <a:t>05/05/16</a:t>
+              <a:t>08/05/16</a:t>
             </a:fld>
             <a:endParaRPr lang="en-US"/>
           </a:p>
@@ -5343,7 +5343,7 @@
             <a:fld id="{0106B4A3-4212-4E39-93DE-E053E8F69C28}" type="datetimeFigureOut">
               <a:rPr lang="en-US" smtClean="0"/>
               <a:pPr/>
-              <a:t>05/05/16</a:t>
+              <a:t>08/05/16</a:t>
             </a:fld>
             <a:endParaRPr lang="en-US"/>
           </a:p>
@@ -5476,7 +5476,7 @@
             <a:fld id="{0106B4A3-4212-4E39-93DE-E053E8F69C28}" type="datetimeFigureOut">
               <a:rPr lang="en-US" smtClean="0"/>
               <a:pPr/>
-              <a:t>05/05/16</a:t>
+              <a:t>08/05/16</a:t>
             </a:fld>
             <a:endParaRPr lang="en-US"/>
           </a:p>
@@ -5573,7 +5573,7 @@
             <a:fld id="{0106B4A3-4212-4E39-93DE-E053E8F69C28}" type="datetimeFigureOut">
               <a:rPr lang="en-US" smtClean="0"/>
               <a:pPr/>
-              <a:t>05/05/16</a:t>
+              <a:t>08/05/16</a:t>
             </a:fld>
             <a:endParaRPr lang="en-US"/>
           </a:p>
@@ -5853,7 +5853,7 @@
             <a:fld id="{0106B4A3-4212-4E39-93DE-E053E8F69C28}" type="datetimeFigureOut">
               <a:rPr lang="en-US" smtClean="0"/>
               <a:pPr/>
-              <a:t>05/05/16</a:t>
+              <a:t>08/05/16</a:t>
             </a:fld>
             <a:endParaRPr lang="en-US"/>
           </a:p>
@@ -6107,7 +6107,7 @@
             <a:fld id="{0106B4A3-4212-4E39-93DE-E053E8F69C28}" type="datetimeFigureOut">
               <a:rPr lang="en-US" smtClean="0"/>
               <a:pPr/>
-              <a:t>05/05/16</a:t>
+              <a:t>08/05/16</a:t>
             </a:fld>
             <a:endParaRPr lang="en-US"/>
           </a:p>
@@ -6481,7 +6481,7 @@
             <a:fld id="{0106B4A3-4212-4E39-93DE-E053E8F69C28}" type="datetimeFigureOut">
               <a:rPr lang="en-US" smtClean="0"/>
               <a:pPr/>
-              <a:t>05/05/16</a:t>
+              <a:t>08/05/16</a:t>
             </a:fld>
             <a:endParaRPr lang="en-US"/>
           </a:p>
@@ -15011,9 +15011,39 @@
           <a:chExt cx="0" cy="0"/>
         </a:xfrm>
       </p:grpSpPr>
+      <p:pic>
+        <p:nvPicPr>
+          <p:cNvPr id="4" name="Picture 3" descr="13153510_10209581449802227_1442761916_n.jpg"/>
+          <p:cNvPicPr>
+            <a:picLocks noChangeAspect="1"/>
+          </p:cNvPicPr>
+          <p:nvPr/>
+        </p:nvPicPr>
+        <p:blipFill>
+          <a:blip r:embed="rId2">
+            <a:extLst>
+              <a:ext uri="{28A0092B-C50C-407E-A947-70E740481C1C}">
+                <a14:useLocalDpi xmlns:a14="http://schemas.microsoft.com/office/drawing/2010/main" val="0"/>
+              </a:ext>
+            </a:extLst>
+          </a:blip>
+          <a:stretch>
+            <a:fillRect/>
+          </a:stretch>
+        </p:blipFill>
+        <p:spPr>
+          <a:xfrm>
+            <a:off x="0" y="0"/>
+            <a:ext cx="9144000" cy="6858000"/>
+          </a:xfrm>
+          <a:prstGeom prst="rect">
+            <a:avLst/>
+          </a:prstGeom>
+        </p:spPr>
+      </p:pic>
       <p:sp>
         <p:nvSpPr>
-          <p:cNvPr id="2" name="Titolo 1"/>
+          <p:cNvPr id="6" name="Titolo 1"/>
           <p:cNvSpPr>
             <a:spLocks noGrp="1"/>
           </p:cNvSpPr>
@@ -15021,35 +15051,71 @@
             <p:ph type="title"/>
           </p:nvPr>
         </p:nvSpPr>
-        <p:spPr/>
+        <p:spPr>
+          <a:xfrm>
+            <a:off x="0" y="0"/>
+            <a:ext cx="9144000" cy="1073274"/>
+          </a:xfrm>
+        </p:spPr>
         <p:txBody>
-          <a:bodyPr/>
+          <a:bodyPr>
+            <a:normAutofit/>
+          </a:bodyPr>
           <a:lstStyle/>
           <a:p>
-            <a:r>
-              <a:rPr lang="it-IT" dirty="0" smtClean="0"/>
+            <a:pPr algn="ctr"/>
+            <a:r>
+              <a:rPr lang="it-IT" sz="5400" b="1" dirty="0" smtClean="0">
+                <a:solidFill>
+                  <a:srgbClr val="008000"/>
+                </a:solidFill>
+              </a:rPr>
               <a:t>Grazie per l’attenzione</a:t>
             </a:r>
-            <a:endParaRPr lang="it-IT" dirty="0"/>
+            <a:endParaRPr lang="it-IT" sz="5400" b="1" dirty="0">
+              <a:solidFill>
+                <a:srgbClr val="008000"/>
+              </a:solidFill>
+            </a:endParaRPr>
           </a:p>
         </p:txBody>
       </p:sp>
       <p:sp>
         <p:nvSpPr>
-          <p:cNvPr id="3" name="Segnaposto contenuto 2"/>
-          <p:cNvSpPr>
-            <a:spLocks noGrp="1"/>
-          </p:cNvSpPr>
-          <p:nvPr>
-            <p:ph idx="1"/>
-          </p:nvPr>
+          <p:cNvPr id="7" name="TextBox 6"/>
+          <p:cNvSpPr txBox="1"/>
+          <p:nvPr/>
         </p:nvSpPr>
-        <p:spPr/>
+        <p:spPr>
+          <a:xfrm>
+            <a:off x="0" y="6021288"/>
+            <a:ext cx="9144000" cy="646331"/>
+          </a:xfrm>
+          <a:prstGeom prst="rect">
+            <a:avLst/>
+          </a:prstGeom>
+          <a:noFill/>
+        </p:spPr>
         <p:txBody>
-          <a:bodyPr/>
+          <a:bodyPr wrap="square" rtlCol="0">
+            <a:spAutoFit/>
+          </a:bodyPr>
           <a:lstStyle/>
           <a:p>
-            <a:endParaRPr lang="it-IT" dirty="0"/>
+            <a:pPr algn="ctr"/>
+            <a:r>
+              <a:rPr lang="en-US" sz="3600" b="1" dirty="0" err="1" smtClean="0">
+                <a:solidFill>
+                  <a:srgbClr val="008000"/>
+                </a:solidFill>
+              </a:rPr>
+              <a:t>TeamSoftwareRevolution</a:t>
+            </a:r>
+            <a:endParaRPr lang="en-US" sz="3600" b="1" dirty="0">
+              <a:solidFill>
+                <a:srgbClr val="008000"/>
+              </a:solidFill>
+            </a:endParaRPr>
           </a:p>
         </p:txBody>
       </p:sp>
@@ -16607,7 +16673,7 @@
             <a:r>
               <a:rPr lang="it-IT" sz="2400" b="1" dirty="0" smtClean="0">
                 <a:solidFill>
-                  <a:srgbClr val="FFC000"/>
+                  <a:srgbClr val="FFFF00"/>
                 </a:solidFill>
               </a:rPr>
               <a:t>Appropriatezza</a:t>
@@ -16669,7 +16735,7 @@
             <a:r>
               <a:rPr lang="it-IT" sz="2400" b="1" dirty="0" smtClean="0">
                 <a:solidFill>
-                  <a:srgbClr val="FFC000"/>
+                  <a:srgbClr val="FFFF00"/>
                 </a:solidFill>
               </a:rPr>
               <a:t>Accuratezza</a:t>
@@ -16731,7 +16797,7 @@
             <a:r>
               <a:rPr lang="it-IT" sz="2400" b="1" dirty="0" smtClean="0">
                 <a:solidFill>
-                  <a:srgbClr val="FFC000"/>
+                  <a:srgbClr val="FFFF00"/>
                 </a:solidFill>
               </a:rPr>
               <a:t>Interoperabilità</a:t>
@@ -16785,7 +16851,7 @@
             <a:r>
               <a:rPr lang="it-IT" sz="2400" b="1" dirty="0" smtClean="0">
                 <a:solidFill>
-                  <a:srgbClr val="FFC000"/>
+                  <a:srgbClr val="FFFF00"/>
                 </a:solidFill>
               </a:rPr>
               <a:t>Conformità</a:t>
@@ -16847,7 +16913,7 @@
             <a:r>
               <a:rPr lang="it-IT" sz="2400" b="1" dirty="0" smtClean="0">
                 <a:solidFill>
-                  <a:srgbClr val="FFC000"/>
+                  <a:srgbClr val="FFFF00"/>
                 </a:solidFill>
               </a:rPr>
               <a:t>Sicurezza</a:t>

</xml_diff>